<commit_message>
new background and update to 2 slides
</commit_message>
<xml_diff>
--- a/MongoDB.pptx
+++ b/MongoDB.pptx
@@ -5,7 +5,7 @@
     <p:sldMasterId id="2147483648" r:id="rId1"/>
   </p:sldMasterIdLst>
   <p:notesMasterIdLst>
-    <p:notesMasterId r:id="rId41"/>
+    <p:notesMasterId r:id="rId40"/>
   </p:notesMasterIdLst>
   <p:sldIdLst>
     <p:sldId id="256" r:id="rId2"/>
@@ -35,18 +35,17 @@
     <p:sldId id="273" r:id="rId26"/>
     <p:sldId id="299" r:id="rId27"/>
     <p:sldId id="275" r:id="rId28"/>
-    <p:sldId id="314" r:id="rId29"/>
-    <p:sldId id="315" r:id="rId30"/>
+    <p:sldId id="315" r:id="rId29"/>
+    <p:sldId id="324" r:id="rId30"/>
     <p:sldId id="316" r:id="rId31"/>
     <p:sldId id="300" r:id="rId32"/>
     <p:sldId id="276" r:id="rId33"/>
-    <p:sldId id="282" r:id="rId34"/>
-    <p:sldId id="281" r:id="rId35"/>
-    <p:sldId id="293" r:id="rId36"/>
-    <p:sldId id="305" r:id="rId37"/>
-    <p:sldId id="301" r:id="rId38"/>
-    <p:sldId id="304" r:id="rId39"/>
-    <p:sldId id="306" r:id="rId40"/>
+    <p:sldId id="281" r:id="rId34"/>
+    <p:sldId id="293" r:id="rId35"/>
+    <p:sldId id="305" r:id="rId36"/>
+    <p:sldId id="301" r:id="rId37"/>
+    <p:sldId id="304" r:id="rId38"/>
+    <p:sldId id="306" r:id="rId39"/>
   </p:sldIdLst>
   <p:sldSz cx="9144000" cy="6858000" type="screen4x3"/>
   <p:notesSz cx="6858000" cy="9144000"/>
@@ -246,7 +245,7 @@
           <a:p>
             <a:fld id="{0A0AACEF-20EC-449C-A177-7D7762A9081E}" type="datetimeFigureOut">
               <a:rPr lang="en-US" smtClean="0"/>
-              <a:t>6/28/17</a:t>
+              <a:t>6/29/17</a:t>
             </a:fld>
             <a:endParaRPr lang="en-US"/>
           </a:p>
@@ -680,19 +679,7 @@
                 <a:ea typeface="+mn-ea"/>
                 <a:cs typeface="+mn-cs"/>
               </a:rPr>
-              <a:t>upports embedded </a:t>
-            </a:r>
-            <a:r>
-              <a:rPr lang="en-US" sz="1200" b="0" i="0" kern="1200" dirty="0" smtClean="0">
-                <a:solidFill>
-                  <a:schemeClr val="tx1"/>
-                </a:solidFill>
-                <a:effectLst/>
-                <a:latin typeface="+mn-lt"/>
-                <a:ea typeface="+mn-ea"/>
-                <a:cs typeface="+mn-cs"/>
-              </a:rPr>
-              <a:t>data models reduces I/O activity on database file system.</a:t>
+              <a:t>upports embedded data models reduces I/O activity on database file system.</a:t>
             </a:r>
           </a:p>
           <a:p>
@@ -834,11 +821,7 @@
           <a:p>
             <a:r>
               <a:rPr lang="en-US" dirty="0" smtClean="0"/>
-              <a:t>Each shard in Mongo </a:t>
-            </a:r>
-            <a:r>
-              <a:rPr lang="en-US" dirty="0" smtClean="0"/>
-              <a:t>uses replica sets for redundancy</a:t>
+              <a:t>Each shard in Mongo uses replica sets for redundancy</a:t>
             </a:r>
             <a:r>
               <a:rPr lang="en-US" baseline="0" dirty="0" smtClean="0"/>
@@ -5301,7 +5284,7 @@
     </p:spTree>
     <p:extLst>
       <p:ext uri="{BB962C8B-B14F-4D97-AF65-F5344CB8AC3E}">
-        <p14:creationId xmlns:p14="http://schemas.microsoft.com/office/powerpoint/2010/main" val="1375703474"/>
+        <p14:creationId xmlns:p14="http://schemas.microsoft.com/office/powerpoint/2010/main" val="1785051379"/>
       </p:ext>
     </p:extLst>
   </p:cSld>
@@ -6298,36 +6281,211 @@
           <a:bodyPr/>
           <a:lstStyle/>
           <a:p>
-            <a:r>
-              <a:rPr lang="en-US" dirty="0" smtClean="0"/>
-              <a:t>Mention that mongo has no real schema</a:t>
-            </a:r>
-            <a:r>
-              <a:rPr lang="en-US" baseline="0" dirty="0" smtClean="0"/>
-              <a:t> validation.</a:t>
-            </a:r>
-          </a:p>
-          <a:p>
-            <a:r>
-              <a:rPr lang="en-US" baseline="0" dirty="0" smtClean="0"/>
-              <a:t>Easy to check a field, no way to stop extra fields</a:t>
-            </a:r>
-          </a:p>
-          <a:p>
-            <a:r>
-              <a:rPr lang="en-US" baseline="0" dirty="0" smtClean="0"/>
-              <a:t>There are multiple mongo clients available.  One of the </a:t>
-            </a:r>
-            <a:r>
-              <a:rPr lang="en-US" baseline="0" dirty="0" err="1" smtClean="0"/>
-              <a:t>populator</a:t>
-            </a:r>
-            <a:r>
-              <a:rPr lang="en-US" baseline="0" dirty="0" smtClean="0"/>
-              <a:t> ones for node is Mongoose which has a schema validation built in</a:t>
-            </a:r>
-          </a:p>
-          <a:p>
+            <a:pPr marL="0" indent="0">
+              <a:buNone/>
+            </a:pPr>
+            <a:r>
+              <a:rPr lang="en-US" dirty="0" err="1" smtClean="0"/>
+              <a:t>db.runCommand</a:t>
+            </a:r>
+            <a:r>
+              <a:rPr lang="en-US" sz="1200" kern="1200" dirty="0" smtClean="0">
+                <a:solidFill>
+                  <a:schemeClr val="tx1"/>
+                </a:solidFill>
+                <a:effectLst/>
+                <a:latin typeface="+mn-lt"/>
+                <a:ea typeface="+mn-ea"/>
+                <a:cs typeface="+mn-cs"/>
+              </a:rPr>
+              <a:t>(</a:t>
+            </a:r>
+            <a:r>
+              <a:rPr lang="en-US" dirty="0" smtClean="0"/>
+              <a:t> </a:t>
+            </a:r>
+            <a:r>
+              <a:rPr lang="en-US" sz="1200" kern="1200" dirty="0" smtClean="0">
+                <a:solidFill>
+                  <a:schemeClr val="tx1"/>
+                </a:solidFill>
+                <a:effectLst/>
+                <a:latin typeface="+mn-lt"/>
+                <a:ea typeface="+mn-ea"/>
+                <a:cs typeface="+mn-cs"/>
+              </a:rPr>
+              <a:t>{</a:t>
+            </a:r>
+            <a:r>
+              <a:rPr lang="en-US" dirty="0" smtClean="0"/>
+              <a:t> </a:t>
+            </a:r>
+            <a:r>
+              <a:rPr lang="en-US" dirty="0" err="1" smtClean="0"/>
+              <a:t>collMod</a:t>
+            </a:r>
+            <a:r>
+              <a:rPr lang="en-US" dirty="0" smtClean="0"/>
+              <a:t>: </a:t>
+            </a:r>
+            <a:r>
+              <a:rPr lang="en-US" sz="1200" kern="1200" dirty="0" smtClean="0">
+                <a:solidFill>
+                  <a:schemeClr val="tx1"/>
+                </a:solidFill>
+                <a:effectLst/>
+                <a:latin typeface="+mn-lt"/>
+                <a:ea typeface="+mn-ea"/>
+                <a:cs typeface="+mn-cs"/>
+              </a:rPr>
+              <a:t>"</a:t>
+            </a:r>
+            <a:r>
+              <a:rPr lang="en-US" sz="1200" dirty="0" smtClean="0"/>
+              <a:t>movies</a:t>
+            </a:r>
+            <a:r>
+              <a:rPr lang="en-US" sz="1200" kern="1200" dirty="0" smtClean="0">
+                <a:solidFill>
+                  <a:schemeClr val="tx1"/>
+                </a:solidFill>
+                <a:effectLst/>
+                <a:latin typeface="+mn-lt"/>
+                <a:ea typeface="+mn-ea"/>
+                <a:cs typeface="+mn-cs"/>
+              </a:rPr>
+              <a:t>"</a:t>
+            </a:r>
+            <a:r>
+              <a:rPr lang="en-US" dirty="0" smtClean="0"/>
+              <a:t>, </a:t>
+            </a:r>
+          </a:p>
+          <a:p>
+            <a:pPr marL="0" indent="0">
+              <a:buNone/>
+            </a:pPr>
+            <a:r>
+              <a:rPr lang="en-US" dirty="0" smtClean="0"/>
+              <a:t>validator: </a:t>
+            </a:r>
+            <a:r>
+              <a:rPr lang="en-US" sz="1200" dirty="0" smtClean="0"/>
+              <a:t>{ $and: </a:t>
+            </a:r>
+          </a:p>
+          <a:p>
+            <a:pPr marL="0" indent="0">
+              <a:buNone/>
+            </a:pPr>
+            <a:r>
+              <a:rPr lang="en-US" sz="1200" dirty="0" smtClean="0"/>
+              <a:t>         [ { title: { $type: "string" } }, </a:t>
+            </a:r>
+          </a:p>
+          <a:p>
+            <a:pPr marL="0" indent="0">
+              <a:buNone/>
+            </a:pPr>
+            <a:r>
+              <a:rPr lang="en-US" sz="1200" dirty="0" smtClean="0"/>
+              <a:t>            { plot: { $type:  "string"} }, </a:t>
+            </a:r>
+          </a:p>
+          <a:p>
+            <a:pPr marL="0" indent="0">
+              <a:buNone/>
+            </a:pPr>
+            <a:r>
+              <a:rPr lang="en-US" sz="1200" dirty="0" smtClean="0"/>
+              <a:t>            {</a:t>
+            </a:r>
+            <a:r>
+              <a:rPr lang="en-US" sz="1200" dirty="0" err="1" smtClean="0"/>
+              <a:t>imdbRating</a:t>
+            </a:r>
+            <a:r>
+              <a:rPr lang="en-US" sz="1200" dirty="0" smtClean="0"/>
+              <a:t>: {$</a:t>
+            </a:r>
+            <a:r>
+              <a:rPr lang="en-US" sz="1200" dirty="0" err="1" smtClean="0"/>
+              <a:t>lte</a:t>
+            </a:r>
+            <a:r>
+              <a:rPr lang="en-US" sz="1200" dirty="0" smtClean="0"/>
+              <a:t>: 10 } } ]</a:t>
+            </a:r>
+          </a:p>
+          <a:p>
+            <a:pPr marL="0" indent="0">
+              <a:buNone/>
+            </a:pPr>
+            <a:r>
+              <a:rPr lang="en-US" sz="1200" dirty="0" smtClean="0"/>
+              <a:t>    } </a:t>
+            </a:r>
+            <a:r>
+              <a:rPr lang="en-US" dirty="0" smtClean="0"/>
+              <a:t>, </a:t>
+            </a:r>
+          </a:p>
+          <a:p>
+            <a:pPr marL="0" indent="0">
+              <a:buNone/>
+            </a:pPr>
+            <a:r>
+              <a:rPr lang="en-US" dirty="0" err="1" smtClean="0"/>
+              <a:t>validationLevel</a:t>
+            </a:r>
+            <a:r>
+              <a:rPr lang="en-US" dirty="0" smtClean="0"/>
+              <a:t>: </a:t>
+            </a:r>
+            <a:r>
+              <a:rPr lang="en-US" sz="1200" kern="1200" dirty="0" smtClean="0">
+                <a:solidFill>
+                  <a:schemeClr val="tx1"/>
+                </a:solidFill>
+                <a:effectLst/>
+                <a:latin typeface="+mn-lt"/>
+                <a:ea typeface="+mn-ea"/>
+                <a:cs typeface="+mn-cs"/>
+              </a:rPr>
+              <a:t>"moderate"</a:t>
+            </a:r>
+            <a:r>
+              <a:rPr lang="en-US" dirty="0" smtClean="0"/>
+              <a:t> </a:t>
+            </a:r>
+            <a:r>
+              <a:rPr lang="en-US" sz="1200" kern="1200" dirty="0" smtClean="0">
+                <a:solidFill>
+                  <a:schemeClr val="tx1"/>
+                </a:solidFill>
+                <a:effectLst/>
+                <a:latin typeface="+mn-lt"/>
+                <a:ea typeface="+mn-ea"/>
+                <a:cs typeface="+mn-cs"/>
+              </a:rPr>
+              <a:t>}</a:t>
+            </a:r>
+            <a:r>
+              <a:rPr lang="en-US" dirty="0" smtClean="0"/>
+              <a:t> </a:t>
+            </a:r>
+            <a:r>
+              <a:rPr lang="en-US" sz="1200" kern="1200" dirty="0" smtClean="0">
+                <a:solidFill>
+                  <a:schemeClr val="tx1"/>
+                </a:solidFill>
+                <a:effectLst/>
+                <a:latin typeface="+mn-lt"/>
+                <a:ea typeface="+mn-ea"/>
+                <a:cs typeface="+mn-cs"/>
+              </a:rPr>
+              <a:t>)</a:t>
+            </a:r>
             <a:endParaRPr lang="en-US" dirty="0"/>
           </a:p>
         </p:txBody>
@@ -6358,7 +6516,7 @@
     </p:spTree>
     <p:extLst>
       <p:ext uri="{BB962C8B-B14F-4D97-AF65-F5344CB8AC3E}">
-        <p14:creationId xmlns:p14="http://schemas.microsoft.com/office/powerpoint/2010/main" val="194980156"/>
+        <p14:creationId xmlns:p14="http://schemas.microsoft.com/office/powerpoint/2010/main" val="4131411509"/>
       </p:ext>
     </p:extLst>
   </p:cSld>
@@ -6412,210 +6570,19 @@
           <a:bodyPr/>
           <a:lstStyle/>
           <a:p>
-            <a:pPr marL="0" indent="0">
-              <a:buNone/>
-            </a:pPr>
-            <a:r>
-              <a:rPr lang="en-US" dirty="0" err="1" smtClean="0"/>
-              <a:t>db.runCommand</a:t>
-            </a:r>
-            <a:r>
-              <a:rPr lang="en-US" sz="1200" kern="1200" dirty="0" smtClean="0">
-                <a:solidFill>
-                  <a:schemeClr val="tx1"/>
-                </a:solidFill>
-                <a:effectLst/>
-                <a:latin typeface="+mn-lt"/>
-                <a:ea typeface="+mn-ea"/>
-                <a:cs typeface="+mn-cs"/>
-              </a:rPr>
-              <a:t>(</a:t>
-            </a:r>
-            <a:r>
-              <a:rPr lang="en-US" dirty="0" smtClean="0"/>
-              <a:t> </a:t>
-            </a:r>
-            <a:r>
-              <a:rPr lang="en-US" sz="1200" kern="1200" dirty="0" smtClean="0">
-                <a:solidFill>
-                  <a:schemeClr val="tx1"/>
-                </a:solidFill>
-                <a:effectLst/>
-                <a:latin typeface="+mn-lt"/>
-                <a:ea typeface="+mn-ea"/>
-                <a:cs typeface="+mn-cs"/>
-              </a:rPr>
-              <a:t>{</a:t>
-            </a:r>
-            <a:r>
-              <a:rPr lang="en-US" dirty="0" smtClean="0"/>
-              <a:t> </a:t>
-            </a:r>
-            <a:r>
-              <a:rPr lang="en-US" dirty="0" err="1" smtClean="0"/>
-              <a:t>collMod</a:t>
-            </a:r>
-            <a:r>
-              <a:rPr lang="en-US" dirty="0" smtClean="0"/>
-              <a:t>: </a:t>
-            </a:r>
-            <a:r>
-              <a:rPr lang="en-US" sz="1200" kern="1200" dirty="0" smtClean="0">
-                <a:solidFill>
-                  <a:schemeClr val="tx1"/>
-                </a:solidFill>
-                <a:effectLst/>
-                <a:latin typeface="+mn-lt"/>
-                <a:ea typeface="+mn-ea"/>
-                <a:cs typeface="+mn-cs"/>
-              </a:rPr>
-              <a:t>"</a:t>
-            </a:r>
-            <a:r>
-              <a:rPr lang="en-US" sz="1200" dirty="0" smtClean="0"/>
-              <a:t>movies</a:t>
-            </a:r>
-            <a:r>
-              <a:rPr lang="en-US" sz="1200" kern="1200" dirty="0" smtClean="0">
-                <a:solidFill>
-                  <a:schemeClr val="tx1"/>
-                </a:solidFill>
-                <a:effectLst/>
-                <a:latin typeface="+mn-lt"/>
-                <a:ea typeface="+mn-ea"/>
-                <a:cs typeface="+mn-cs"/>
-              </a:rPr>
-              <a:t>"</a:t>
-            </a:r>
-            <a:r>
-              <a:rPr lang="en-US" dirty="0" smtClean="0"/>
-              <a:t>, </a:t>
-            </a:r>
-          </a:p>
-          <a:p>
-            <a:pPr marL="0" indent="0">
-              <a:buNone/>
-            </a:pPr>
-            <a:r>
-              <a:rPr lang="en-US" dirty="0" smtClean="0"/>
-              <a:t>validator: </a:t>
-            </a:r>
-            <a:r>
-              <a:rPr lang="en-US" sz="1200" dirty="0" smtClean="0"/>
-              <a:t>{ $and: </a:t>
-            </a:r>
-          </a:p>
-          <a:p>
-            <a:pPr marL="0" indent="0">
-              <a:buNone/>
-            </a:pPr>
-            <a:r>
-              <a:rPr lang="en-US" sz="1200" dirty="0" smtClean="0"/>
-              <a:t>         [ { title: { $type: "string" } }, </a:t>
-            </a:r>
-          </a:p>
-          <a:p>
-            <a:pPr marL="0" indent="0">
-              <a:buNone/>
-            </a:pPr>
-            <a:r>
-              <a:rPr lang="en-US" sz="1200" dirty="0" smtClean="0"/>
-              <a:t>            { plot: { $type:  "string"} }, </a:t>
-            </a:r>
-          </a:p>
-          <a:p>
-            <a:pPr marL="0" indent="0">
-              <a:buNone/>
-            </a:pPr>
-            <a:r>
-              <a:rPr lang="en-US" sz="1200" dirty="0" smtClean="0"/>
-              <a:t>            {</a:t>
-            </a:r>
-            <a:r>
-              <a:rPr lang="en-US" sz="1200" dirty="0" err="1" smtClean="0"/>
-              <a:t>imdbRating</a:t>
-            </a:r>
-            <a:r>
-              <a:rPr lang="en-US" sz="1200" dirty="0" smtClean="0"/>
-              <a:t>: {$</a:t>
-            </a:r>
-            <a:r>
-              <a:rPr lang="en-US" sz="1200" dirty="0" err="1" smtClean="0"/>
-              <a:t>lte</a:t>
-            </a:r>
-            <a:r>
-              <a:rPr lang="en-US" sz="1200" dirty="0" smtClean="0"/>
-              <a:t>: 10 } } ]</a:t>
-            </a:r>
-          </a:p>
-          <a:p>
-            <a:pPr marL="0" indent="0">
-              <a:buNone/>
-            </a:pPr>
-            <a:r>
-              <a:rPr lang="en-US" sz="1200" dirty="0" smtClean="0"/>
-              <a:t>    } </a:t>
-            </a:r>
-            <a:r>
-              <a:rPr lang="en-US" dirty="0" smtClean="0"/>
-              <a:t>, </a:t>
-            </a:r>
-          </a:p>
-          <a:p>
-            <a:pPr marL="0" indent="0">
-              <a:buNone/>
-            </a:pPr>
-            <a:r>
-              <a:rPr lang="en-US" dirty="0" err="1" smtClean="0"/>
-              <a:t>validationLevel</a:t>
-            </a:r>
-            <a:r>
-              <a:rPr lang="en-US" dirty="0" smtClean="0"/>
-              <a:t>: </a:t>
-            </a:r>
-            <a:r>
-              <a:rPr lang="en-US" sz="1200" kern="1200" dirty="0" smtClean="0">
-                <a:solidFill>
-                  <a:schemeClr val="tx1"/>
-                </a:solidFill>
-                <a:effectLst/>
-                <a:latin typeface="+mn-lt"/>
-                <a:ea typeface="+mn-ea"/>
-                <a:cs typeface="+mn-cs"/>
-              </a:rPr>
-              <a:t>"moderate"</a:t>
-            </a:r>
-            <a:r>
-              <a:rPr lang="en-US" dirty="0" smtClean="0"/>
-              <a:t> </a:t>
-            </a:r>
-            <a:r>
-              <a:rPr lang="en-US" sz="1200" kern="1200" dirty="0" smtClean="0">
-                <a:solidFill>
-                  <a:schemeClr val="tx1"/>
-                </a:solidFill>
-                <a:effectLst/>
-                <a:latin typeface="+mn-lt"/>
-                <a:ea typeface="+mn-ea"/>
-                <a:cs typeface="+mn-cs"/>
-              </a:rPr>
-              <a:t>}</a:t>
-            </a:r>
-            <a:r>
-              <a:rPr lang="en-US" dirty="0" smtClean="0"/>
-              <a:t> </a:t>
-            </a:r>
-            <a:r>
-              <a:rPr lang="en-US" sz="1200" kern="1200" dirty="0" smtClean="0">
-                <a:solidFill>
-                  <a:schemeClr val="tx1"/>
-                </a:solidFill>
-                <a:effectLst/>
-                <a:latin typeface="+mn-lt"/>
-                <a:ea typeface="+mn-ea"/>
-                <a:cs typeface="+mn-cs"/>
-              </a:rPr>
-              <a:t>)</a:t>
+            <a:r>
+              <a:rPr lang="en-US" dirty="0" smtClean="0"/>
+              <a:t>Let’s look at the typical TODO app</a:t>
+            </a:r>
+            <a:r>
+              <a:rPr lang="en-US" baseline="0" dirty="0" smtClean="0"/>
+              <a:t> example</a:t>
+            </a:r>
+          </a:p>
+          <a:p>
+            <a:r>
+              <a:rPr lang="en-US" baseline="0" dirty="0" smtClean="0"/>
+              <a:t>Show how it works</a:t>
             </a:r>
             <a:endParaRPr lang="en-US" dirty="0"/>
           </a:p>
@@ -6647,7 +6614,7 @@
     </p:spTree>
     <p:extLst>
       <p:ext uri="{BB962C8B-B14F-4D97-AF65-F5344CB8AC3E}">
-        <p14:creationId xmlns:p14="http://schemas.microsoft.com/office/powerpoint/2010/main" val="4131411509"/>
+        <p14:creationId xmlns:p14="http://schemas.microsoft.com/office/powerpoint/2010/main" val="929287221"/>
       </p:ext>
     </p:extLst>
   </p:cSld>
@@ -6703,17 +6670,19 @@
           <a:p>
             <a:r>
               <a:rPr lang="en-US" dirty="0" smtClean="0"/>
-              <a:t>Let’s look at the typical TODO app</a:t>
+              <a:t>So we are going</a:t>
             </a:r>
             <a:r>
               <a:rPr lang="en-US" baseline="0" dirty="0" smtClean="0"/>
-              <a:t> example</a:t>
-            </a:r>
-          </a:p>
-          <a:p>
+              <a:t> to add a favorite star icon to identify </a:t>
+            </a:r>
+            <a:r>
+              <a:rPr lang="en-US" baseline="0" dirty="0" err="1" smtClean="0"/>
+              <a:t>todos</a:t>
+            </a:r>
             <a:r>
               <a:rPr lang="en-US" baseline="0" dirty="0" smtClean="0"/>
-              <a:t>Show how it works</a:t>
+              <a:t> as high priority.</a:t>
             </a:r>
             <a:endParaRPr lang="en-US" dirty="0"/>
           </a:p>
@@ -6745,7 +6714,7 @@
     </p:spTree>
     <p:extLst>
       <p:ext uri="{BB962C8B-B14F-4D97-AF65-F5344CB8AC3E}">
-        <p14:creationId xmlns:p14="http://schemas.microsoft.com/office/powerpoint/2010/main" val="929287221"/>
+        <p14:creationId xmlns:p14="http://schemas.microsoft.com/office/powerpoint/2010/main" val="3652462619"/>
       </p:ext>
     </p:extLst>
   </p:cSld>
@@ -6799,22 +6768,6 @@
           <a:bodyPr/>
           <a:lstStyle/>
           <a:p>
-            <a:r>
-              <a:rPr lang="en-US" dirty="0" smtClean="0"/>
-              <a:t>So we are going</a:t>
-            </a:r>
-            <a:r>
-              <a:rPr lang="en-US" baseline="0" dirty="0" smtClean="0"/>
-              <a:t> to add a favorite star icon to identify </a:t>
-            </a:r>
-            <a:r>
-              <a:rPr lang="en-US" baseline="0" dirty="0" err="1" smtClean="0"/>
-              <a:t>todos</a:t>
-            </a:r>
-            <a:r>
-              <a:rPr lang="en-US" baseline="0" dirty="0" smtClean="0"/>
-              <a:t> as high priority.</a:t>
-            </a:r>
             <a:endParaRPr lang="en-US" dirty="0"/>
           </a:p>
         </p:txBody>
@@ -6845,7 +6798,7 @@
     </p:spTree>
     <p:extLst>
       <p:ext uri="{BB962C8B-B14F-4D97-AF65-F5344CB8AC3E}">
-        <p14:creationId xmlns:p14="http://schemas.microsoft.com/office/powerpoint/2010/main" val="3652462619"/>
+        <p14:creationId xmlns:p14="http://schemas.microsoft.com/office/powerpoint/2010/main" val="929287221"/>
       </p:ext>
     </p:extLst>
   </p:cSld>
@@ -6899,6 +6852,47 @@
           <a:bodyPr/>
           <a:lstStyle/>
           <a:p>
+            <a:pPr marL="0" marR="0" indent="0" algn="l" defTabSz="914400" rtl="0" eaLnBrk="1" fontAlgn="auto" latinLnBrk="0" hangingPunct="1">
+              <a:lnSpc>
+                <a:spcPct val="100000"/>
+              </a:lnSpc>
+              <a:spcBef>
+                <a:spcPts val="0"/>
+              </a:spcBef>
+              <a:spcAft>
+                <a:spcPts val="0"/>
+              </a:spcAft>
+              <a:buClrTx/>
+              <a:buSzTx/>
+              <a:buFontTx/>
+              <a:buNone/>
+              <a:tabLst/>
+              <a:defRPr/>
+            </a:pPr>
+            <a:r>
+              <a:rPr lang="en-US" dirty="0" smtClean="0"/>
+              <a:t>This</a:t>
+            </a:r>
+            <a:r>
+              <a:rPr lang="en-US" baseline="0" dirty="0" smtClean="0"/>
+              <a:t> example app uses the </a:t>
+            </a:r>
+            <a:r>
+              <a:rPr lang="en-US" baseline="0" dirty="0" err="1" smtClean="0"/>
+              <a:t>mongojs</a:t>
+            </a:r>
+            <a:r>
+              <a:rPr lang="en-US" baseline="0" dirty="0" smtClean="0"/>
+              <a:t> node module to talk to </a:t>
+            </a:r>
+            <a:r>
+              <a:rPr lang="en-US" baseline="0" dirty="0" err="1" smtClean="0"/>
+              <a:t>MongoDB</a:t>
+            </a:r>
+            <a:r>
+              <a:rPr lang="en-US" baseline="0" dirty="0" smtClean="0"/>
+              <a:t>.  It gives you a simple way to execute mongo commands.  You can see the update command looks like you are in the mongo shell.  </a:t>
+            </a:r>
             <a:endParaRPr lang="en-US" dirty="0"/>
           </a:p>
         </p:txBody>
@@ -6929,7 +6923,7 @@
     </p:spTree>
     <p:extLst>
       <p:ext uri="{BB962C8B-B14F-4D97-AF65-F5344CB8AC3E}">
-        <p14:creationId xmlns:p14="http://schemas.microsoft.com/office/powerpoint/2010/main" val="929287221"/>
+        <p14:creationId xmlns:p14="http://schemas.microsoft.com/office/powerpoint/2010/main" val="912051105"/>
       </p:ext>
     </p:extLst>
   </p:cSld>
@@ -7001,29 +6995,20 @@
               <a:defRPr/>
             </a:pPr>
             <a:r>
-              <a:rPr lang="en-US" dirty="0" smtClean="0"/>
-              <a:t>This</a:t>
-            </a:r>
-            <a:r>
               <a:rPr lang="en-US" baseline="0" dirty="0" smtClean="0"/>
-              <a:t> example app uses the </a:t>
+              <a:t>The only oddity here is that since we are just passing the </a:t>
             </a:r>
             <a:r>
               <a:rPr lang="en-US" baseline="0" dirty="0" err="1" smtClean="0"/>
-              <a:t>mongojs</a:t>
+              <a:t>json</a:t>
             </a:r>
             <a:r>
               <a:rPr lang="en-US" baseline="0" dirty="0" smtClean="0"/>
-              <a:t> node module to talk to </a:t>
-            </a:r>
-            <a:r>
-              <a:rPr lang="en-US" baseline="0" dirty="0" err="1" smtClean="0"/>
-              <a:t>MongoDB</a:t>
-            </a:r>
-            <a:r>
-              <a:rPr lang="en-US" baseline="0" dirty="0" smtClean="0"/>
-              <a:t>.  It gives you a simple way to execute mongo commands.  You can see the update command looks like you are in the mongo shell.  </a:t>
-            </a:r>
+              <a:t> request on, we remove the _id first.</a:t>
+            </a:r>
+            <a:endParaRPr lang="en-US" dirty="0" smtClean="0"/>
+          </a:p>
+          <a:p>
             <a:endParaRPr lang="en-US" dirty="0"/>
           </a:p>
         </p:txBody>
@@ -7046,122 +7031,6 @@
             <a:fld id="{7ECDF86E-C09E-4C73-8798-F0685C098AE7}" type="slidenum">
               <a:rPr lang="en-US" smtClean="0"/>
               <a:t>38</a:t>
-            </a:fld>
-            <a:endParaRPr lang="en-US"/>
-          </a:p>
-        </p:txBody>
-      </p:sp>
-    </p:spTree>
-    <p:extLst>
-      <p:ext uri="{BB962C8B-B14F-4D97-AF65-F5344CB8AC3E}">
-        <p14:creationId xmlns:p14="http://schemas.microsoft.com/office/powerpoint/2010/main" val="912051105"/>
-      </p:ext>
-    </p:extLst>
-  </p:cSld>
-  <p:clrMapOvr>
-    <a:masterClrMapping/>
-  </p:clrMapOvr>
-</p:notes>
-</file>
-
-<file path=ppt/notesSlides/notesSlide39.xml><?xml version="1.0" encoding="utf-8"?>
-<p:notes xmlns:a="http://schemas.openxmlformats.org/drawingml/2006/main" xmlns:r="http://schemas.openxmlformats.org/officeDocument/2006/relationships" xmlns:p="http://schemas.openxmlformats.org/presentationml/2006/main">
-  <p:cSld>
-    <p:spTree>
-      <p:nvGrpSpPr>
-        <p:cNvPr id="1" name=""/>
-        <p:cNvGrpSpPr/>
-        <p:nvPr/>
-      </p:nvGrpSpPr>
-      <p:grpSpPr>
-        <a:xfrm>
-          <a:off x="0" y="0"/>
-          <a:ext cx="0" cy="0"/>
-          <a:chOff x="0" y="0"/>
-          <a:chExt cx="0" cy="0"/>
-        </a:xfrm>
-      </p:grpSpPr>
-      <p:sp>
-        <p:nvSpPr>
-          <p:cNvPr id="2" name="Slide Image Placeholder 1"/>
-          <p:cNvSpPr>
-            <a:spLocks noGrp="1" noRot="1" noChangeAspect="1"/>
-          </p:cNvSpPr>
-          <p:nvPr>
-            <p:ph type="sldImg"/>
-          </p:nvPr>
-        </p:nvSpPr>
-        <p:spPr/>
-      </p:sp>
-      <p:sp>
-        <p:nvSpPr>
-          <p:cNvPr id="3" name="Notes Placeholder 2"/>
-          <p:cNvSpPr>
-            <a:spLocks noGrp="1"/>
-          </p:cNvSpPr>
-          <p:nvPr>
-            <p:ph type="body" idx="1"/>
-          </p:nvPr>
-        </p:nvSpPr>
-        <p:spPr/>
-        <p:txBody>
-          <a:bodyPr/>
-          <a:lstStyle/>
-          <a:p>
-            <a:pPr marL="0" marR="0" indent="0" algn="l" defTabSz="914400" rtl="0" eaLnBrk="1" fontAlgn="auto" latinLnBrk="0" hangingPunct="1">
-              <a:lnSpc>
-                <a:spcPct val="100000"/>
-              </a:lnSpc>
-              <a:spcBef>
-                <a:spcPts val="0"/>
-              </a:spcBef>
-              <a:spcAft>
-                <a:spcPts val="0"/>
-              </a:spcAft>
-              <a:buClrTx/>
-              <a:buSzTx/>
-              <a:buFontTx/>
-              <a:buNone/>
-              <a:tabLst/>
-              <a:defRPr/>
-            </a:pPr>
-            <a:r>
-              <a:rPr lang="en-US" baseline="0" dirty="0" smtClean="0"/>
-              <a:t>The only oddity here is that since we are just passing the </a:t>
-            </a:r>
-            <a:r>
-              <a:rPr lang="en-US" baseline="0" dirty="0" err="1" smtClean="0"/>
-              <a:t>json</a:t>
-            </a:r>
-            <a:r>
-              <a:rPr lang="en-US" baseline="0" dirty="0" smtClean="0"/>
-              <a:t> request on, we remove the _id first.</a:t>
-            </a:r>
-            <a:endParaRPr lang="en-US" dirty="0" smtClean="0"/>
-          </a:p>
-          <a:p>
-            <a:endParaRPr lang="en-US" dirty="0"/>
-          </a:p>
-        </p:txBody>
-      </p:sp>
-      <p:sp>
-        <p:nvSpPr>
-          <p:cNvPr id="4" name="Slide Number Placeholder 3"/>
-          <p:cNvSpPr>
-            <a:spLocks noGrp="1"/>
-          </p:cNvSpPr>
-          <p:nvPr>
-            <p:ph type="sldNum" sz="quarter" idx="10"/>
-          </p:nvPr>
-        </p:nvSpPr>
-        <p:spPr/>
-        <p:txBody>
-          <a:bodyPr/>
-          <a:lstStyle/>
-          <a:p>
-            <a:fld id="{7ECDF86E-C09E-4C73-8798-F0685C098AE7}" type="slidenum">
-              <a:rPr lang="en-US" smtClean="0"/>
-              <a:t>39</a:t>
             </a:fld>
             <a:endParaRPr lang="en-US"/>
           </a:p>
@@ -7242,11 +7111,7 @@
             </a:r>
             <a:r>
               <a:rPr lang="en-US" dirty="0" smtClean="0"/>
-              <a:t>) called </a:t>
-            </a:r>
-            <a:r>
-              <a:rPr lang="en-US" dirty="0" smtClean="0"/>
-              <a:t>BSON</a:t>
+              <a:t>) called BSON</a:t>
             </a:r>
             <a:r>
               <a:rPr lang="en-US" baseline="0" dirty="0" smtClean="0"/>
@@ -7358,23 +7223,7 @@
             </a:r>
             <a:r>
               <a:rPr lang="en-US" baseline="0" dirty="0" smtClean="0"/>
-              <a:t> a primary </a:t>
-            </a:r>
-            <a:r>
-              <a:rPr lang="en-US" baseline="0" dirty="0" smtClean="0"/>
-              <a:t>key that can be assigned by MongoDB which is a GUID. </a:t>
-            </a:r>
-            <a:r>
-              <a:rPr lang="en-US" baseline="0" dirty="0" smtClean="0"/>
-              <a:t>Documents </a:t>
-            </a:r>
-            <a:r>
-              <a:rPr lang="en-US" baseline="0" dirty="0" smtClean="0"/>
-              <a:t>can contain references to other document, pointing to the “_id” of another document</a:t>
-            </a:r>
-            <a:r>
-              <a:rPr lang="en-US" baseline="0" dirty="0" smtClean="0"/>
-              <a:t>.  </a:t>
+              <a:t> a primary key that can be assigned by MongoDB which is a GUID. Documents can contain references to other document, pointing to the “_id” of another document.  </a:t>
             </a:r>
             <a:endParaRPr lang="en-US" dirty="0"/>
           </a:p>
@@ -7674,11 +7523,7 @@
           <a:p>
             <a:r>
               <a:rPr lang="en-US" baseline="0" dirty="0" smtClean="0"/>
-              <a:t>Mongo uses Horizontal </a:t>
-            </a:r>
-            <a:r>
-              <a:rPr lang="en-US" baseline="0" dirty="0" smtClean="0"/>
-              <a:t>scaling: documents can be partitioned between servers to distribute the load</a:t>
+              <a:t>Mongo uses Horizontal scaling: documents can be partitioned between servers to distribute the load</a:t>
             </a:r>
           </a:p>
           <a:p>
@@ -8026,7 +7871,19 @@
                 <a:ea typeface="+mn-ea"/>
                 <a:cs typeface="+mn-cs"/>
               </a:rPr>
-              <a:t>: </a:t>
+              <a:t>: The router provides an interface between client applications and the </a:t>
+            </a:r>
+            <a:r>
+              <a:rPr lang="en-US" sz="1200" b="0" i="0" kern="1200" dirty="0" err="1" smtClean="0">
+                <a:solidFill>
+                  <a:schemeClr val="tx1"/>
+                </a:solidFill>
+                <a:effectLst/>
+                <a:latin typeface="+mn-lt"/>
+                <a:ea typeface="+mn-ea"/>
+                <a:cs typeface="+mn-cs"/>
+              </a:rPr>
+              <a:t>sharded</a:t>
             </a:r>
             <a:r>
               <a:rPr lang="en-US" sz="1200" b="0" i="0" kern="1200" dirty="0" smtClean="0">
@@ -8038,67 +7895,7 @@
                 <a:ea typeface="+mn-ea"/>
                 <a:cs typeface="+mn-cs"/>
               </a:rPr>
-              <a:t>The </a:t>
-            </a:r>
-            <a:r>
-              <a:rPr lang="en-US" sz="1200" b="0" i="0" kern="1200" dirty="0" smtClean="0">
-                <a:solidFill>
-                  <a:schemeClr val="tx1"/>
-                </a:solidFill>
-                <a:effectLst/>
-                <a:latin typeface="+mn-lt"/>
-                <a:ea typeface="+mn-ea"/>
-                <a:cs typeface="+mn-cs"/>
-              </a:rPr>
-              <a:t>router provides </a:t>
-            </a:r>
-            <a:r>
-              <a:rPr lang="en-US" sz="1200" b="0" i="0" kern="1200" dirty="0" smtClean="0">
-                <a:solidFill>
-                  <a:schemeClr val="tx1"/>
-                </a:solidFill>
-                <a:effectLst/>
-                <a:latin typeface="+mn-lt"/>
-                <a:ea typeface="+mn-ea"/>
-                <a:cs typeface="+mn-cs"/>
-              </a:rPr>
-              <a:t>an interface between client applications and the </a:t>
-            </a:r>
-            <a:r>
-              <a:rPr lang="en-US" sz="1200" b="0" i="0" kern="1200" dirty="0" err="1" smtClean="0">
-                <a:solidFill>
-                  <a:schemeClr val="tx1"/>
-                </a:solidFill>
-                <a:effectLst/>
-                <a:latin typeface="+mn-lt"/>
-                <a:ea typeface="+mn-ea"/>
-                <a:cs typeface="+mn-cs"/>
-              </a:rPr>
-              <a:t>sharded</a:t>
-            </a:r>
-            <a:r>
-              <a:rPr lang="en-US" sz="1200" b="0" i="0" kern="1200" dirty="0" smtClean="0">
-                <a:solidFill>
-                  <a:schemeClr val="tx1"/>
-                </a:solidFill>
-                <a:effectLst/>
-                <a:latin typeface="+mn-lt"/>
-                <a:ea typeface="+mn-ea"/>
-                <a:cs typeface="+mn-cs"/>
-              </a:rPr>
-              <a:t> </a:t>
-            </a:r>
-            <a:r>
-              <a:rPr lang="en-US" sz="1200" b="0" i="0" kern="1200" dirty="0" smtClean="0">
-                <a:solidFill>
-                  <a:schemeClr val="tx1"/>
-                </a:solidFill>
-                <a:effectLst/>
-                <a:latin typeface="+mn-lt"/>
-                <a:ea typeface="+mn-ea"/>
-                <a:cs typeface="+mn-cs"/>
-              </a:rPr>
-              <a:t>cluster</a:t>
+              <a:t> cluster</a:t>
             </a:r>
             <a:r>
               <a:rPr lang="en-US" sz="1200" b="0" i="0" kern="1200" baseline="0" dirty="0" smtClean="0">
@@ -8477,7 +8274,7 @@
           <a:p>
             <a:fld id="{2ADC2C9B-E509-4817-BA72-5DA0722D8BF9}" type="datetimeFigureOut">
               <a:rPr lang="en-US" smtClean="0"/>
-              <a:t>6/28/17</a:t>
+              <a:t>6/29/17</a:t>
             </a:fld>
             <a:endParaRPr lang="en-US"/>
           </a:p>
@@ -8647,7 +8444,7 @@
           <a:p>
             <a:fld id="{2ADC2C9B-E509-4817-BA72-5DA0722D8BF9}" type="datetimeFigureOut">
               <a:rPr lang="en-US" smtClean="0"/>
-              <a:t>6/28/17</a:t>
+              <a:t>6/29/17</a:t>
             </a:fld>
             <a:endParaRPr lang="en-US"/>
           </a:p>
@@ -8827,7 +8624,7 @@
           <a:p>
             <a:fld id="{2ADC2C9B-E509-4817-BA72-5DA0722D8BF9}" type="datetimeFigureOut">
               <a:rPr lang="en-US" smtClean="0"/>
-              <a:t>6/28/17</a:t>
+              <a:t>6/29/17</a:t>
             </a:fld>
             <a:endParaRPr lang="en-US"/>
           </a:p>
@@ -8997,7 +8794,7 @@
           <a:p>
             <a:fld id="{2ADC2C9B-E509-4817-BA72-5DA0722D8BF9}" type="datetimeFigureOut">
               <a:rPr lang="en-US" smtClean="0"/>
-              <a:t>6/28/17</a:t>
+              <a:t>6/29/17</a:t>
             </a:fld>
             <a:endParaRPr lang="en-US"/>
           </a:p>
@@ -9243,7 +9040,7 @@
           <a:p>
             <a:fld id="{2ADC2C9B-E509-4817-BA72-5DA0722D8BF9}" type="datetimeFigureOut">
               <a:rPr lang="en-US" smtClean="0"/>
-              <a:t>6/28/17</a:t>
+              <a:t>6/29/17</a:t>
             </a:fld>
             <a:endParaRPr lang="en-US"/>
           </a:p>
@@ -9531,7 +9328,7 @@
           <a:p>
             <a:fld id="{2ADC2C9B-E509-4817-BA72-5DA0722D8BF9}" type="datetimeFigureOut">
               <a:rPr lang="en-US" smtClean="0"/>
-              <a:t>6/28/17</a:t>
+              <a:t>6/29/17</a:t>
             </a:fld>
             <a:endParaRPr lang="en-US"/>
           </a:p>
@@ -9953,7 +9750,7 @@
           <a:p>
             <a:fld id="{2ADC2C9B-E509-4817-BA72-5DA0722D8BF9}" type="datetimeFigureOut">
               <a:rPr lang="en-US" smtClean="0"/>
-              <a:t>6/28/17</a:t>
+              <a:t>6/29/17</a:t>
             </a:fld>
             <a:endParaRPr lang="en-US"/>
           </a:p>
@@ -10071,7 +9868,7 @@
           <a:p>
             <a:fld id="{2ADC2C9B-E509-4817-BA72-5DA0722D8BF9}" type="datetimeFigureOut">
               <a:rPr lang="en-US" smtClean="0"/>
-              <a:t>6/28/17</a:t>
+              <a:t>6/29/17</a:t>
             </a:fld>
             <a:endParaRPr lang="en-US"/>
           </a:p>
@@ -10166,7 +9963,7 @@
           <a:p>
             <a:fld id="{2ADC2C9B-E509-4817-BA72-5DA0722D8BF9}" type="datetimeFigureOut">
               <a:rPr lang="en-US" smtClean="0"/>
-              <a:t>6/28/17</a:t>
+              <a:t>6/29/17</a:t>
             </a:fld>
             <a:endParaRPr lang="en-US"/>
           </a:p>
@@ -10443,7 +10240,7 @@
           <a:p>
             <a:fld id="{2ADC2C9B-E509-4817-BA72-5DA0722D8BF9}" type="datetimeFigureOut">
               <a:rPr lang="en-US" smtClean="0"/>
-              <a:t>6/28/17</a:t>
+              <a:t>6/29/17</a:t>
             </a:fld>
             <a:endParaRPr lang="en-US"/>
           </a:p>
@@ -10696,7 +10493,7 @@
           <a:p>
             <a:fld id="{2ADC2C9B-E509-4817-BA72-5DA0722D8BF9}" type="datetimeFigureOut">
               <a:rPr lang="en-US" smtClean="0"/>
-              <a:t>6/28/17</a:t>
+              <a:t>6/29/17</a:t>
             </a:fld>
             <a:endParaRPr lang="en-US"/>
           </a:p>
@@ -10761,9 +10558,18 @@
 <p:sldMaster xmlns:a="http://schemas.openxmlformats.org/drawingml/2006/main" xmlns:r="http://schemas.openxmlformats.org/officeDocument/2006/relationships" xmlns:p="http://schemas.openxmlformats.org/presentationml/2006/main">
   <p:cSld>
     <p:bg>
-      <p:bgRef idx="1003">
-        <a:schemeClr val="bg1"/>
-      </p:bgRef>
+      <p:bgPr>
+        <a:blipFill dpi="0" rotWithShape="1">
+          <a:blip r:embed="rId13">
+            <a:lum/>
+          </a:blip>
+          <a:srcRect/>
+          <a:stretch>
+            <a:fillRect/>
+          </a:stretch>
+        </a:blipFill>
+        <a:effectLst/>
+      </p:bgPr>
     </p:bg>
     <p:spTree>
       <p:nvGrpSpPr>
@@ -10909,7 +10715,7 @@
           <a:p>
             <a:fld id="{2ADC2C9B-E509-4817-BA72-5DA0722D8BF9}" type="datetimeFigureOut">
               <a:rPr lang="en-US" smtClean="0"/>
-              <a:t>6/28/17</a:t>
+              <a:t>6/29/17</a:t>
             </a:fld>
             <a:endParaRPr lang="en-US"/>
           </a:p>
@@ -11296,37 +11102,41 @@
         </p:nvSpPr>
         <p:spPr/>
         <p:txBody>
-          <a:bodyPr/>
+          <a:bodyPr>
+            <a:normAutofit fontScale="90000"/>
+          </a:bodyPr>
           <a:lstStyle/>
           <a:p>
             <a:r>
               <a:rPr lang="en-US" b="1" dirty="0" smtClean="0"/>
               <a:t>MongoDB</a:t>
             </a:r>
-            <a:endParaRPr lang="en-US" b="1" dirty="0"/>
-          </a:p>
-        </p:txBody>
-      </p:sp>
-      <p:sp>
-        <p:nvSpPr>
-          <p:cNvPr id="3" name="Subtitle 2"/>
-          <p:cNvSpPr>
-            <a:spLocks noGrp="1"/>
-          </p:cNvSpPr>
-          <p:nvPr>
-            <p:ph type="subTitle" idx="1"/>
-          </p:nvPr>
-        </p:nvSpPr>
-        <p:spPr/>
-        <p:txBody>
-          <a:bodyPr/>
-          <a:lstStyle/>
-          <a:p>
-            <a:r>
+            <a:br>
               <a:rPr lang="en-US" b="1" dirty="0" smtClean="0"/>
-              <a:t>Hands-on test drive</a:t>
-            </a:r>
-            <a:endParaRPr lang="en-US" b="1" dirty="0"/>
+            </a:br>
+            <a:r>
+              <a:rPr lang="en-US" b="1" dirty="0"/>
+              <a:t/>
+            </a:r>
+            <a:br>
+              <a:rPr lang="en-US" b="1" dirty="0"/>
+            </a:br>
+            <a:r>
+              <a:rPr lang="en-US" sz="2700" dirty="0" smtClean="0"/>
+              <a:t>Hands on test drive</a:t>
+            </a:r>
+            <a:br>
+              <a:rPr lang="en-US" sz="2700" dirty="0" smtClean="0"/>
+            </a:br>
+            <a:r>
+              <a:rPr lang="en-US" sz="2700" dirty="0" smtClean="0"/>
+              <a:t>Dan Van Valin &amp; Kevin </a:t>
+            </a:r>
+            <a:r>
+              <a:rPr lang="en-US" sz="2700" dirty="0" err="1" smtClean="0"/>
+              <a:t>McGinty</a:t>
+            </a:r>
+            <a:endParaRPr lang="en-US" sz="2700" dirty="0"/>
           </a:p>
         </p:txBody>
       </p:sp>
@@ -11340,6 +11150,13 @@
   <p:clrMapOvr>
     <a:masterClrMapping/>
   </p:clrMapOvr>
+  <p:timing>
+    <p:tnLst>
+      <p:par>
+        <p:cTn id="1" dur="indefinite" restart="never" nodeType="tmRoot"/>
+      </p:par>
+    </p:tnLst>
+  </p:timing>
 </p:sld>
 </file>
 
@@ -11412,11 +11229,7 @@
           <a:p>
             <a:r>
               <a:rPr lang="en-US" dirty="0" smtClean="0"/>
-              <a:t>Horizontal </a:t>
-            </a:r>
-            <a:r>
-              <a:rPr lang="en-US" dirty="0" smtClean="0"/>
-              <a:t>Scaling</a:t>
+              <a:t>Horizontal Scaling</a:t>
             </a:r>
           </a:p>
           <a:p>
@@ -11565,6 +11378,13 @@
   <p:clrMapOvr>
     <a:masterClrMapping/>
   </p:clrMapOvr>
+  <p:timing>
+    <p:tnLst>
+      <p:par>
+        <p:cTn id="1" dur="indefinite" restart="never" nodeType="tmRoot"/>
+      </p:par>
+    </p:tnLst>
+  </p:timing>
 </p:sld>
 </file>
 
@@ -11762,6 +11582,13 @@
   <p:clrMapOvr>
     <a:masterClrMapping/>
   </p:clrMapOvr>
+  <p:timing>
+    <p:tnLst>
+      <p:par>
+        <p:cTn id="1" dur="indefinite" restart="never" nodeType="tmRoot"/>
+      </p:par>
+    </p:tnLst>
+  </p:timing>
 </p:sld>
 </file>
 
@@ -11965,6 +11792,13 @@
   <p:clrMapOvr>
     <a:masterClrMapping/>
   </p:clrMapOvr>
+  <p:timing>
+    <p:tnLst>
+      <p:par>
+        <p:cTn id="1" dur="indefinite" restart="never" nodeType="tmRoot"/>
+      </p:par>
+    </p:tnLst>
+  </p:timing>
 </p:sld>
 </file>
 
@@ -12200,6 +12034,13 @@
   <p:clrMapOvr>
     <a:masterClrMapping/>
   </p:clrMapOvr>
+  <p:timing>
+    <p:tnLst>
+      <p:par>
+        <p:cTn id="1" dur="indefinite" restart="never" nodeType="tmRoot"/>
+      </p:par>
+    </p:tnLst>
+  </p:timing>
 </p:sld>
 </file>
 
@@ -12434,6 +12275,13 @@
   <p:clrMapOvr>
     <a:masterClrMapping/>
   </p:clrMapOvr>
+  <p:timing>
+    <p:tnLst>
+      <p:par>
+        <p:cTn id="1" dur="indefinite" restart="never" nodeType="tmRoot"/>
+      </p:par>
+    </p:tnLst>
+  </p:timing>
 </p:sld>
 </file>
 
@@ -12672,6 +12520,13 @@
   <p:clrMapOvr>
     <a:masterClrMapping/>
   </p:clrMapOvr>
+  <p:timing>
+    <p:tnLst>
+      <p:par>
+        <p:cTn id="1" dur="indefinite" restart="never" nodeType="tmRoot"/>
+      </p:par>
+    </p:tnLst>
+  </p:timing>
 </p:sld>
 </file>
 
@@ -13032,6 +12887,13 @@
   <p:clrMapOvr>
     <a:masterClrMapping/>
   </p:clrMapOvr>
+  <p:timing>
+    <p:tnLst>
+      <p:par>
+        <p:cTn id="1" dur="indefinite" restart="never" nodeType="tmRoot"/>
+      </p:par>
+    </p:tnLst>
+  </p:timing>
 </p:sld>
 </file>
 
@@ -13257,6 +13119,13 @@
   <p:clrMapOvr>
     <a:masterClrMapping/>
   </p:clrMapOvr>
+  <p:timing>
+    <p:tnLst>
+      <p:par>
+        <p:cTn id="1" dur="indefinite" restart="never" nodeType="tmRoot"/>
+      </p:par>
+    </p:tnLst>
+  </p:timing>
 </p:sld>
 </file>
 
@@ -13400,6 +13269,13 @@
   <p:clrMapOvr>
     <a:masterClrMapping/>
   </p:clrMapOvr>
+  <p:timing>
+    <p:tnLst>
+      <p:par>
+        <p:cTn id="1" dur="indefinite" restart="never" nodeType="tmRoot"/>
+      </p:par>
+    </p:tnLst>
+  </p:timing>
 </p:sld>
 </file>
 
@@ -13462,7 +13338,6 @@
               <a:rPr lang="en-US" dirty="0" smtClean="0"/>
               <a:t>NoSQL</a:t>
             </a:r>
-            <a:endParaRPr lang="en-US" dirty="0" smtClean="0"/>
           </a:p>
         </p:txBody>
       </p:sp>
@@ -14104,6 +13979,13 @@
   <p:clrMapOvr>
     <a:masterClrMapping/>
   </p:clrMapOvr>
+  <p:timing>
+    <p:tnLst>
+      <p:par>
+        <p:cTn id="1" dur="indefinite" restart="never" nodeType="tmRoot"/>
+      </p:par>
+    </p:tnLst>
+  </p:timing>
 </p:sld>
 </file>
 
@@ -14371,6 +14253,13 @@
   <p:clrMapOvr>
     <a:masterClrMapping/>
   </p:clrMapOvr>
+  <p:timing>
+    <p:tnLst>
+      <p:par>
+        <p:cTn id="1" dur="indefinite" restart="never" nodeType="tmRoot"/>
+      </p:par>
+    </p:tnLst>
+  </p:timing>
 </p:sld>
 </file>
 
@@ -14691,6 +14580,13 @@
   <p:clrMapOvr>
     <a:masterClrMapping/>
   </p:clrMapOvr>
+  <p:timing>
+    <p:tnLst>
+      <p:par>
+        <p:cTn id="1" dur="indefinite" restart="never" nodeType="tmRoot"/>
+      </p:par>
+    </p:tnLst>
+  </p:timing>
 </p:sld>
 </file>
 
@@ -14744,7 +14640,12 @@
             <p:ph idx="1"/>
           </p:nvPr>
         </p:nvSpPr>
-        <p:spPr/>
+        <p:spPr>
+          <a:xfrm>
+            <a:off x="457200" y="1295400"/>
+            <a:ext cx="8229600" cy="4525963"/>
+          </a:xfrm>
+        </p:spPr>
         <p:txBody>
           <a:bodyPr/>
           <a:lstStyle/>
@@ -14798,7 +14699,20 @@
                 <a:ea typeface="Arial Unicode MS" panose="020B0604020202020204" pitchFamily="34" charset="-128"/>
                 <a:cs typeface="Arial Unicode MS" panose="020B0604020202020204" pitchFamily="34" charset="-128"/>
               </a:rPr>
-              <a:t>db.&lt;collection&gt;.update(criteria, { op : portion </a:t>
+              <a:t>db.&lt;collection&gt;.update(criteria, { op : portion },     </a:t>
+            </a:r>
+          </a:p>
+          <a:p>
+            <a:pPr marL="0" indent="0">
+              <a:buNone/>
+            </a:pPr>
+            <a:r>
+              <a:rPr lang="en-US" sz="2400" b="1" dirty="0">
+                <a:latin typeface="Arial Unicode MS" panose="020B0604020202020204" pitchFamily="34" charset="-128"/>
+                <a:ea typeface="Arial Unicode MS" panose="020B0604020202020204" pitchFamily="34" charset="-128"/>
+                <a:cs typeface="Arial Unicode MS" panose="020B0604020202020204" pitchFamily="34" charset="-128"/>
+              </a:rPr>
+              <a:t> </a:t>
             </a:r>
             <a:r>
               <a:rPr lang="en-US" sz="2400" b="1" dirty="0" smtClean="0">
@@ -14806,36 +14720,7 @@
                 <a:ea typeface="Arial Unicode MS" panose="020B0604020202020204" pitchFamily="34" charset="-128"/>
                 <a:cs typeface="Arial Unicode MS" panose="020B0604020202020204" pitchFamily="34" charset="-128"/>
               </a:rPr>
-              <a:t>},     </a:t>
-            </a:r>
-          </a:p>
-          <a:p>
-            <a:pPr marL="0" indent="0">
-              <a:buNone/>
-            </a:pPr>
-            <a:r>
-              <a:rPr lang="en-US" sz="2400" b="1" dirty="0">
-                <a:latin typeface="Arial Unicode MS" panose="020B0604020202020204" pitchFamily="34" charset="-128"/>
-                <a:ea typeface="Arial Unicode MS" panose="020B0604020202020204" pitchFamily="34" charset="-128"/>
-                <a:cs typeface="Arial Unicode MS" panose="020B0604020202020204" pitchFamily="34" charset="-128"/>
-              </a:rPr>
-              <a:t> </a:t>
-            </a:r>
-            <a:r>
-              <a:rPr lang="en-US" sz="2400" b="1" dirty="0" smtClean="0">
-                <a:latin typeface="Arial Unicode MS" panose="020B0604020202020204" pitchFamily="34" charset="-128"/>
-                <a:ea typeface="Arial Unicode MS" panose="020B0604020202020204" pitchFamily="34" charset="-128"/>
-                <a:cs typeface="Arial Unicode MS" panose="020B0604020202020204" pitchFamily="34" charset="-128"/>
-              </a:rPr>
-              <a:t>                                              </a:t>
-            </a:r>
-            <a:r>
-              <a:rPr lang="en-US" sz="2400" b="1" dirty="0" smtClean="0">
-                <a:latin typeface="Arial Unicode MS" panose="020B0604020202020204" pitchFamily="34" charset="-128"/>
-                <a:ea typeface="Arial Unicode MS" panose="020B0604020202020204" pitchFamily="34" charset="-128"/>
-                <a:cs typeface="Arial Unicode MS" panose="020B0604020202020204" pitchFamily="34" charset="-128"/>
-              </a:rPr>
-              <a:t> parameters)</a:t>
+              <a:t>                                               parameters)</a:t>
             </a:r>
             <a:endParaRPr lang="en-US" sz="2400" b="1" dirty="0" smtClean="0"/>
           </a:p>
@@ -14894,6 +14779,13 @@
   <p:clrMapOvr>
     <a:masterClrMapping/>
   </p:clrMapOvr>
+  <p:timing>
+    <p:tnLst>
+      <p:par>
+        <p:cTn id="1" dur="indefinite" restart="never" nodeType="tmRoot"/>
+      </p:par>
+    </p:tnLst>
+  </p:timing>
 </p:sld>
 </file>
 
@@ -15060,21 +14952,8 @@
                 <a:ea typeface="Arial Unicode MS" panose="020B0604020202020204" pitchFamily="34" charset="-128"/>
                 <a:cs typeface="Arial Unicode MS" panose="020B0604020202020204" pitchFamily="34" charset="-128"/>
               </a:rPr>
-              <a:t>251,188,924</a:t>
-            </a:r>
-            <a:r>
-              <a:rPr lang="en-US" sz="2400" b="1" dirty="0" smtClean="0">
-                <a:latin typeface="Arial Unicode MS" panose="020B0604020202020204" pitchFamily="34" charset="-128"/>
-                <a:ea typeface="Arial Unicode MS" panose="020B0604020202020204" pitchFamily="34" charset="-128"/>
-                <a:cs typeface="Arial Unicode MS" panose="020B0604020202020204" pitchFamily="34" charset="-128"/>
-              </a:rPr>
-              <a:t>"}} )</a:t>
-            </a:r>
-            <a:endParaRPr lang="en-US" sz="2400" b="1" dirty="0" smtClean="0">
-              <a:latin typeface="Arial Unicode MS" panose="020B0604020202020204" pitchFamily="34" charset="-128"/>
-              <a:ea typeface="Arial Unicode MS" panose="020B0604020202020204" pitchFamily="34" charset="-128"/>
-              <a:cs typeface="Arial Unicode MS" panose="020B0604020202020204" pitchFamily="34" charset="-128"/>
-            </a:endParaRPr>
+              <a:t>251,188,924"}} )</a:t>
+            </a:r>
           </a:p>
         </p:txBody>
       </p:sp>
@@ -15312,6 +15191,13 @@
   <p:clrMapOvr>
     <a:masterClrMapping/>
   </p:clrMapOvr>
+  <p:timing>
+    <p:tnLst>
+      <p:par>
+        <p:cTn id="1" dur="indefinite" restart="never" nodeType="tmRoot"/>
+      </p:par>
+    </p:tnLst>
+  </p:timing>
 </p:sld>
 </file>
 
@@ -15380,14 +15266,7 @@
                 <a:ea typeface="Arial Unicode MS" panose="020B0604020202020204" pitchFamily="34" charset="-128"/>
                 <a:cs typeface="Arial Unicode MS" panose="020B0604020202020204" pitchFamily="34" charset="-128"/>
               </a:rPr>
-              <a:t>1. </a:t>
-            </a:r>
-            <a:r>
-              <a:rPr lang="en-US" sz="2800" dirty="0" smtClean="0">
-                <a:ea typeface="Arial Unicode MS" panose="020B0604020202020204" pitchFamily="34" charset="-128"/>
-                <a:cs typeface="Arial Unicode MS" panose="020B0604020202020204" pitchFamily="34" charset="-128"/>
-              </a:rPr>
-              <a:t>Add “Jack </a:t>
+              <a:t>1. Add “Jack </a:t>
             </a:r>
             <a:r>
               <a:rPr lang="en-US" sz="2800" dirty="0" err="1" smtClean="0">
@@ -15422,14 +15301,7 @@
                 <a:ea typeface="Arial Unicode MS" panose="020B0604020202020204" pitchFamily="34" charset="-128"/>
                 <a:cs typeface="Arial Unicode MS" panose="020B0604020202020204" pitchFamily="34" charset="-128"/>
               </a:rPr>
-              <a:t>2. </a:t>
-            </a:r>
-            <a:r>
-              <a:rPr lang="en-US" sz="2800" dirty="0" smtClean="0">
-                <a:ea typeface="Arial Unicode MS" panose="020B0604020202020204" pitchFamily="34" charset="-128"/>
-                <a:cs typeface="Arial Unicode MS" panose="020B0604020202020204" pitchFamily="34" charset="-128"/>
-              </a:rPr>
-              <a:t>Add “Action” to the genre for “The Incredibles”.  </a:t>
+              <a:t>2. Add “Action” to the genre for “The Incredibles”.  </a:t>
             </a:r>
             <a:endParaRPr lang="en-US" sz="1600" dirty="0">
               <a:ea typeface="Arial Unicode MS" panose="020B0604020202020204" pitchFamily="34" charset="-128"/>
@@ -15647,6 +15519,13 @@
   <p:clrMapOvr>
     <a:masterClrMapping/>
   </p:clrMapOvr>
+  <p:timing>
+    <p:tnLst>
+      <p:par>
+        <p:cTn id="1" dur="indefinite" restart="never" nodeType="tmRoot"/>
+      </p:par>
+    </p:tnLst>
+  </p:timing>
 </p:sld>
 </file>
 
@@ -15707,50 +15586,50 @@
           </a:bodyPr>
           <a:lstStyle/>
           <a:p>
-            <a:pPr marL="457200" indent="-457200">
-              <a:buAutoNum type="arabicPeriod"/>
-            </a:pPr>
+            <a:pPr marL="0" indent="0">
+              <a:buNone/>
+            </a:pPr>
+            <a:r>
+              <a:rPr lang="en-US" sz="2200" dirty="0">
+                <a:ea typeface="Arial Unicode MS" panose="020B0604020202020204" pitchFamily="34" charset="-128"/>
+                <a:cs typeface="Arial Unicode MS" panose="020B0604020202020204" pitchFamily="34" charset="-128"/>
+              </a:rPr>
+              <a:t>1</a:t>
+            </a:r>
             <a:r>
               <a:rPr lang="en-US" sz="2200" dirty="0" smtClean="0">
                 <a:ea typeface="Arial Unicode MS" panose="020B0604020202020204" pitchFamily="34" charset="-128"/>
                 <a:cs typeface="Arial Unicode MS" panose="020B0604020202020204" pitchFamily="34" charset="-128"/>
               </a:rPr>
-              <a:t>Add a </a:t>
+              <a:t>. </a:t>
+            </a:r>
+            <a:r>
+              <a:rPr lang="en-US" sz="2200" dirty="0" smtClean="0">
+                <a:ea typeface="Arial Unicode MS" panose="020B0604020202020204" pitchFamily="34" charset="-128"/>
+                <a:cs typeface="Arial Unicode MS" panose="020B0604020202020204" pitchFamily="34" charset="-128"/>
+              </a:rPr>
+              <a:t>Add “Jack </a:t>
             </a:r>
             <a:r>
               <a:rPr lang="en-US" sz="2200" dirty="0" err="1" smtClean="0">
                 <a:ea typeface="Arial Unicode MS" panose="020B0604020202020204" pitchFamily="34" charset="-128"/>
                 <a:cs typeface="Arial Unicode MS" panose="020B0604020202020204" pitchFamily="34" charset="-128"/>
               </a:rPr>
-              <a:t>boxOffice</a:t>
+              <a:t>Palance</a:t>
             </a:r>
             <a:r>
               <a:rPr lang="en-US" sz="2200" dirty="0" smtClean="0">
                 <a:ea typeface="Arial Unicode MS" panose="020B0604020202020204" pitchFamily="34" charset="-128"/>
                 <a:cs typeface="Arial Unicode MS" panose="020B0604020202020204" pitchFamily="34" charset="-128"/>
               </a:rPr>
-              <a:t> of value of "$</a:t>
-            </a:r>
-            <a:r>
-              <a:rPr lang="en-US" sz="2200" dirty="0">
-                <a:ea typeface="Arial Unicode MS" panose="020B0604020202020204" pitchFamily="34" charset="-128"/>
-                <a:cs typeface="Arial Unicode MS" panose="020B0604020202020204" pitchFamily="34" charset="-128"/>
-              </a:rPr>
-              <a:t>261,441,092 to The Incredibles</a:t>
-            </a:r>
-            <a:r>
-              <a:rPr lang="en-US" sz="2200" dirty="0" smtClean="0">
-                <a:ea typeface="Arial Unicode MS" panose="020B0604020202020204" pitchFamily="34" charset="-128"/>
-                <a:cs typeface="Arial Unicode MS" panose="020B0604020202020204" pitchFamily="34" charset="-128"/>
-              </a:rPr>
-              <a:t>.</a:t>
-            </a:r>
-          </a:p>
-          <a:p>
-            <a:pPr marL="457200" indent="-457200">
-              <a:buAutoNum type="arabicPeriod"/>
-            </a:pPr>
-            <a:endParaRPr lang="en-US" sz="1100" dirty="0">
+              <a:t>” to the actors for Batman.</a:t>
+            </a:r>
+          </a:p>
+          <a:p>
+            <a:pPr marL="0" indent="0">
+              <a:buNone/>
+            </a:pPr>
+            <a:endParaRPr lang="en-US" sz="1100" dirty="0" smtClean="0">
               <a:ea typeface="Arial Unicode MS" panose="020B0604020202020204" pitchFamily="34" charset="-128"/>
               <a:cs typeface="Arial Unicode MS" panose="020B0604020202020204" pitchFamily="34" charset="-128"/>
             </a:endParaRPr>
@@ -15760,7 +15639,7 @@
               <a:buNone/>
             </a:pPr>
             <a:r>
-              <a:rPr lang="en-US" sz="2800" b="1" dirty="0" err="1" smtClean="0"/>
+              <a:rPr lang="en-US" sz="2800" b="1" dirty="0" err="1"/>
               <a:t>db.movies.update</a:t>
             </a:r>
             <a:r>
@@ -15769,15 +15648,7 @@
             </a:r>
             <a:r>
               <a:rPr lang="en-US" sz="2800" b="1" dirty="0" err="1"/>
-              <a:t>title</a:t>
-            </a:r>
-            <a:r>
-              <a:rPr lang="en-US" sz="2800" b="1" dirty="0" err="1" smtClean="0"/>
-              <a:t>:“The</a:t>
-            </a:r>
-            <a:r>
-              <a:rPr lang="en-US" sz="2800" b="1" dirty="0" smtClean="0"/>
-              <a:t> Incredibles</a:t>
+              <a:t>title:"Batman</a:t>
             </a:r>
             <a:r>
               <a:rPr lang="en-US" sz="2800" b="1" dirty="0" smtClean="0"/>
@@ -15794,31 +15665,25 @@
             </a:r>
             <a:r>
               <a:rPr lang="en-US" sz="2800" b="1" dirty="0" smtClean="0"/>
-              <a:t>    </a:t>
-            </a:r>
-            <a:r>
-              <a:rPr lang="en-US" sz="2800" b="1" dirty="0" smtClean="0"/>
-              <a:t>{$</a:t>
+              <a:t>    {$</a:t>
             </a:r>
             <a:r>
               <a:rPr lang="en-US" sz="2800" b="1" dirty="0"/>
-              <a:t>set: {</a:t>
+              <a:t>push: {actors: "Jack </a:t>
             </a:r>
             <a:r>
               <a:rPr lang="en-US" sz="2800" b="1" dirty="0" err="1"/>
-              <a:t>boxOffice</a:t>
+              <a:t>Palance</a:t>
             </a:r>
             <a:r>
               <a:rPr lang="en-US" sz="2800" b="1" dirty="0"/>
-              <a:t>: </a:t>
-            </a:r>
-            <a:r>
-              <a:rPr lang="en-US" sz="2800" b="1" dirty="0" smtClean="0"/>
-              <a:t>“$261,441,092”}})</a:t>
-            </a:r>
-            <a:endParaRPr lang="en-US" sz="2800" b="1" dirty="0"/>
-          </a:p>
-          <a:p>
+              <a:t>"}})</a:t>
+            </a:r>
+          </a:p>
+          <a:p>
+            <a:pPr marL="0" indent="0">
+              <a:buNone/>
+            </a:pPr>
             <a:endParaRPr lang="en-US" sz="2200" dirty="0" smtClean="0">
               <a:ea typeface="Arial Unicode MS" panose="020B0604020202020204" pitchFamily="34" charset="-128"/>
               <a:cs typeface="Arial Unicode MS" panose="020B0604020202020204" pitchFamily="34" charset="-128"/>
@@ -15847,13 +15712,20 @@
     </p:spTree>
     <p:extLst>
       <p:ext uri="{BB962C8B-B14F-4D97-AF65-F5344CB8AC3E}">
-        <p14:creationId xmlns:p14="http://schemas.microsoft.com/office/powerpoint/2010/main" val="3051124988"/>
+        <p14:creationId xmlns:p14="http://schemas.microsoft.com/office/powerpoint/2010/main" val="1988644146"/>
       </p:ext>
     </p:extLst>
   </p:cSld>
   <p:clrMapOvr>
     <a:masterClrMapping/>
   </p:clrMapOvr>
+  <p:timing>
+    <p:tnLst>
+      <p:par>
+        <p:cTn id="1" dur="indefinite" restart="never" nodeType="tmRoot"/>
+      </p:par>
+    </p:tnLst>
+  </p:timing>
 </p:sld>
 </file>
 
@@ -15929,22 +15801,19 @@
                 <a:ea typeface="Arial Unicode MS" panose="020B0604020202020204" pitchFamily="34" charset="-128"/>
                 <a:cs typeface="Arial Unicode MS" panose="020B0604020202020204" pitchFamily="34" charset="-128"/>
               </a:rPr>
-              <a:t>. Add “Jack </a:t>
-            </a:r>
-            <a:r>
-              <a:rPr lang="en-US" sz="2200" dirty="0" err="1" smtClean="0">
-                <a:ea typeface="Arial Unicode MS" panose="020B0604020202020204" pitchFamily="34" charset="-128"/>
-                <a:cs typeface="Arial Unicode MS" panose="020B0604020202020204" pitchFamily="34" charset="-128"/>
-              </a:rPr>
-              <a:t>Palance</a:t>
-            </a:r>
-            <a:r>
-              <a:rPr lang="en-US" sz="2200" dirty="0" smtClean="0">
-                <a:ea typeface="Arial Unicode MS" panose="020B0604020202020204" pitchFamily="34" charset="-128"/>
-                <a:cs typeface="Arial Unicode MS" panose="020B0604020202020204" pitchFamily="34" charset="-128"/>
-              </a:rPr>
-              <a:t>” to the actors for Batman.</a:t>
-            </a:r>
+              <a:t>. </a:t>
+            </a:r>
+            <a:r>
+              <a:rPr lang="en-US" sz="2400" dirty="0">
+                <a:ea typeface="Arial Unicode MS" panose="020B0604020202020204" pitchFamily="34" charset="-128"/>
+                <a:cs typeface="Arial Unicode MS" panose="020B0604020202020204" pitchFamily="34" charset="-128"/>
+              </a:rPr>
+              <a:t>Add “Action” to the genre for “The Incredibles”. </a:t>
+            </a:r>
+            <a:endParaRPr lang="en-US" sz="2200" dirty="0" smtClean="0">
+              <a:ea typeface="Arial Unicode MS" panose="020B0604020202020204" pitchFamily="34" charset="-128"/>
+              <a:cs typeface="Arial Unicode MS" panose="020B0604020202020204" pitchFamily="34" charset="-128"/>
+            </a:endParaRPr>
           </a:p>
           <a:p>
             <a:pPr marL="0" indent="0">
@@ -15964,17 +15833,18 @@
               <a:t>db.movies.update</a:t>
             </a:r>
             <a:r>
-              <a:rPr lang="en-US" sz="2800" b="1" dirty="0"/>
-              <a:t>({</a:t>
-            </a:r>
-            <a:r>
-              <a:rPr lang="en-US" sz="2800" b="1" dirty="0" err="1"/>
-              <a:t>title:"Batman</a:t>
-            </a:r>
-            <a:r>
               <a:rPr lang="en-US" sz="2800" b="1" dirty="0" smtClean="0"/>
-              <a:t>"},</a:t>
-            </a:r>
+              <a:t>( { </a:t>
+            </a:r>
+            <a:r>
+              <a:rPr lang="en-US" sz="2800" b="1" dirty="0" err="1" smtClean="0"/>
+              <a:t>title:”The</a:t>
+            </a:r>
+            <a:r>
+              <a:rPr lang="en-US" sz="2800" b="1" dirty="0" smtClean="0"/>
+              <a:t> Incredibles” },</a:t>
+            </a:r>
+            <a:endParaRPr lang="en-US" sz="2800" b="1" dirty="0" smtClean="0"/>
           </a:p>
           <a:p>
             <a:pPr marL="0" indent="0">
@@ -15990,20 +15860,33 @@
             </a:r>
             <a:r>
               <a:rPr lang="en-US" sz="2800" b="1" dirty="0" smtClean="0"/>
-              <a:t>{$</a:t>
+              <a:t>{ $</a:t>
             </a:r>
             <a:r>
               <a:rPr lang="en-US" sz="2800" b="1" dirty="0"/>
-              <a:t>push: {actors: "Jack </a:t>
-            </a:r>
-            <a:r>
-              <a:rPr lang="en-US" sz="2800" b="1" dirty="0" err="1"/>
-              <a:t>Palance</a:t>
-            </a:r>
-            <a:r>
-              <a:rPr lang="en-US" sz="2800" b="1" dirty="0"/>
-              <a:t>"}})</a:t>
-            </a:r>
+              <a:t>push: </a:t>
+            </a:r>
+            <a:r>
+              <a:rPr lang="en-US" sz="2800" b="1" dirty="0" smtClean="0"/>
+              <a:t>{ “</a:t>
+            </a:r>
+            <a:r>
+              <a:rPr lang="en-US" sz="2800" b="1" dirty="0" err="1" smtClean="0"/>
+              <a:t>details.genre</a:t>
+            </a:r>
+            <a:r>
+              <a:rPr lang="en-US" sz="2800" b="1" dirty="0" smtClean="0"/>
+              <a:t>” : ”</a:t>
+            </a:r>
+            <a:r>
+              <a:rPr lang="en-US" sz="2800" b="1" dirty="0" smtClean="0"/>
+              <a:t>Action</a:t>
+            </a:r>
+            <a:r>
+              <a:rPr lang="en-US" sz="2800" b="1" dirty="0" smtClean="0"/>
+              <a:t>” } } )</a:t>
+            </a:r>
+            <a:endParaRPr lang="en-US" sz="2800" b="1" dirty="0"/>
           </a:p>
           <a:p>
             <a:pPr marL="0" indent="0">
@@ -16037,13 +15920,20 @@
     </p:spTree>
     <p:extLst>
       <p:ext uri="{BB962C8B-B14F-4D97-AF65-F5344CB8AC3E}">
-        <p14:creationId xmlns:p14="http://schemas.microsoft.com/office/powerpoint/2010/main" val="1988644146"/>
+        <p14:creationId xmlns:p14="http://schemas.microsoft.com/office/powerpoint/2010/main" val="721130200"/>
       </p:ext>
     </p:extLst>
   </p:cSld>
   <p:clrMapOvr>
     <a:masterClrMapping/>
   </p:clrMapOvr>
+  <p:timing>
+    <p:tnLst>
+      <p:par>
+        <p:cTn id="1" dur="indefinite" restart="never" nodeType="tmRoot"/>
+      </p:par>
+    </p:tnLst>
+  </p:timing>
 </p:sld>
 </file>
 
@@ -16291,6 +16181,13 @@
   <p:clrMapOvr>
     <a:masterClrMapping/>
   </p:clrMapOvr>
+  <p:timing>
+    <p:tnLst>
+      <p:par>
+        <p:cTn id="1" dur="indefinite" restart="never" nodeType="tmRoot"/>
+      </p:par>
+    </p:tnLst>
+  </p:timing>
 </p:sld>
 </file>
 
@@ -16380,14 +16277,7 @@
                 <a:ea typeface="Arial Unicode MS" panose="020B0604020202020204" pitchFamily="34" charset="-128"/>
                 <a:cs typeface="Arial Unicode MS" panose="020B0604020202020204" pitchFamily="34" charset="-128"/>
               </a:rPr>
-              <a:t>   </a:t>
-            </a:r>
-            <a:r>
-              <a:rPr lang="en-US" sz="2800" b="1" dirty="0" smtClean="0">
-                <a:ea typeface="Arial Unicode MS" panose="020B0604020202020204" pitchFamily="34" charset="-128"/>
-                <a:cs typeface="Arial Unicode MS" panose="020B0604020202020204" pitchFamily="34" charset="-128"/>
-              </a:rPr>
-              <a:t>	</a:t>
+              <a:t>   	</a:t>
             </a:r>
             <a:r>
               <a:rPr lang="en-US" sz="2800" dirty="0" smtClean="0">
@@ -16424,14 +16314,7 @@
                 <a:ea typeface="Arial Unicode MS" panose="020B0604020202020204" pitchFamily="34" charset="-128"/>
                 <a:cs typeface="Arial Unicode MS" panose="020B0604020202020204" pitchFamily="34" charset="-128"/>
               </a:rPr>
-              <a:t>             	</a:t>
-            </a:r>
-            <a:r>
-              <a:rPr lang="en-US" sz="2800" dirty="0" smtClean="0">
-                <a:ea typeface="Arial Unicode MS" panose="020B0604020202020204" pitchFamily="34" charset="-128"/>
-                <a:cs typeface="Arial Unicode MS" panose="020B0604020202020204" pitchFamily="34" charset="-128"/>
-              </a:rPr>
-              <a:t>specified </a:t>
+              <a:t>             	specified </a:t>
             </a:r>
             <a:r>
               <a:rPr lang="en-US" sz="2800" dirty="0">
@@ -16487,14 +16370,7 @@
                 <a:ea typeface="Arial Unicode MS" panose="020B0604020202020204" pitchFamily="34" charset="-128"/>
                 <a:cs typeface="Arial Unicode MS" panose="020B0604020202020204" pitchFamily="34" charset="-128"/>
               </a:rPr>
-              <a:t>   </a:t>
-            </a:r>
-            <a:r>
-              <a:rPr lang="en-US" sz="2800" b="1" dirty="0" smtClean="0">
-                <a:ea typeface="Arial Unicode MS" panose="020B0604020202020204" pitchFamily="34" charset="-128"/>
-                <a:cs typeface="Arial Unicode MS" panose="020B0604020202020204" pitchFamily="34" charset="-128"/>
-              </a:rPr>
-              <a:t>  	</a:t>
+              <a:t>     	</a:t>
             </a:r>
             <a:r>
               <a:rPr lang="en-US" sz="2800" dirty="0" smtClean="0">
@@ -16534,14 +16410,7 @@
                 <a:ea typeface="Arial Unicode MS" panose="020B0604020202020204" pitchFamily="34" charset="-128"/>
                 <a:cs typeface="Arial Unicode MS" panose="020B0604020202020204" pitchFamily="34" charset="-128"/>
               </a:rPr>
-              <a:t>	</a:t>
-            </a:r>
-            <a:r>
-              <a:rPr lang="en-US" sz="2800" dirty="0" smtClean="0">
-                <a:ea typeface="Arial Unicode MS" panose="020B0604020202020204" pitchFamily="34" charset="-128"/>
-                <a:cs typeface="Arial Unicode MS" panose="020B0604020202020204" pitchFamily="34" charset="-128"/>
-              </a:rPr>
-              <a:t>specified amount.</a:t>
+              <a:t>	specified amount.</a:t>
             </a:r>
           </a:p>
           <a:p>
@@ -16609,14 +16478,7 @@
                 <a:ea typeface="Arial Unicode MS" panose="020B0604020202020204" pitchFamily="34" charset="-128"/>
                 <a:cs typeface="Arial Unicode MS" panose="020B0604020202020204" pitchFamily="34" charset="-128"/>
               </a:rPr>
-              <a:t>                   	</a:t>
-            </a:r>
-            <a:r>
-              <a:rPr lang="en-US" sz="2800" dirty="0" smtClean="0">
-                <a:ea typeface="Arial Unicode MS" panose="020B0604020202020204" pitchFamily="34" charset="-128"/>
-                <a:cs typeface="Arial Unicode MS" panose="020B0604020202020204" pitchFamily="34" charset="-128"/>
-              </a:rPr>
-              <a:t>document.</a:t>
+              <a:t>                   	document.</a:t>
             </a:r>
           </a:p>
           <a:p>
@@ -16637,14 +16499,7 @@
                 <a:ea typeface="Arial Unicode MS" panose="020B0604020202020204" pitchFamily="34" charset="-128"/>
                 <a:cs typeface="Arial Unicode MS" panose="020B0604020202020204" pitchFamily="34" charset="-128"/>
               </a:rPr>
-              <a:t>$rename   </a:t>
-            </a:r>
-            <a:r>
-              <a:rPr lang="en-US" sz="2800" b="1" dirty="0" smtClean="0">
-                <a:ea typeface="Arial Unicode MS" panose="020B0604020202020204" pitchFamily="34" charset="-128"/>
-                <a:cs typeface="Arial Unicode MS" panose="020B0604020202020204" pitchFamily="34" charset="-128"/>
-              </a:rPr>
-              <a:t>	</a:t>
+              <a:t>$rename   	</a:t>
             </a:r>
             <a:r>
               <a:rPr lang="en-US" sz="2800" dirty="0" smtClean="0">
@@ -16709,6 +16564,13 @@
   <p:clrMapOvr>
     <a:masterClrMapping/>
   </p:clrMapOvr>
+  <p:timing>
+    <p:tnLst>
+      <p:par>
+        <p:cTn id="1" dur="indefinite" restart="never" nodeType="tmRoot"/>
+      </p:par>
+    </p:tnLst>
+  </p:timing>
 </p:sld>
 </file>
 
@@ -16839,6 +16701,13 @@
   <p:clrMapOvr>
     <a:masterClrMapping/>
   </p:clrMapOvr>
+  <p:timing>
+    <p:tnLst>
+      <p:par>
+        <p:cTn id="1" dur="indefinite" restart="never" nodeType="tmRoot"/>
+      </p:par>
+    </p:tnLst>
+  </p:timing>
 </p:sld>
 </file>
 
@@ -16876,7 +16745,7 @@
           <a:p>
             <a:r>
               <a:rPr lang="en-US" dirty="0" smtClean="0"/>
-              <a:t>Validation</a:t>
+              <a:t>Other Features</a:t>
             </a:r>
             <a:endParaRPr lang="en-US" dirty="0"/>
           </a:p>
@@ -16905,7 +16774,7 @@
                 <a:ea typeface="Arial Unicode MS" panose="020B0604020202020204" pitchFamily="34" charset="-128"/>
                 <a:cs typeface="Arial Unicode MS" panose="020B0604020202020204" pitchFamily="34" charset="-128"/>
               </a:rPr>
-              <a:t>Occurs during insert and update</a:t>
+              <a:t>Validation</a:t>
             </a:r>
           </a:p>
           <a:p>
@@ -16915,7 +16784,7 @@
                 <a:ea typeface="Arial Unicode MS" panose="020B0604020202020204" pitchFamily="34" charset="-128"/>
                 <a:cs typeface="Arial Unicode MS" panose="020B0604020202020204" pitchFamily="34" charset="-128"/>
               </a:rPr>
-              <a:t>A selector that must pass</a:t>
+              <a:t>Aggregation/Map Reduce</a:t>
             </a:r>
           </a:p>
           <a:p>
@@ -16925,41 +16794,60 @@
                 <a:ea typeface="Arial Unicode MS" panose="020B0604020202020204" pitchFamily="34" charset="-128"/>
                 <a:cs typeface="Arial Unicode MS" panose="020B0604020202020204" pitchFamily="34" charset="-128"/>
               </a:rPr>
-              <a:t>Can be set to different levels</a:t>
-            </a:r>
-          </a:p>
-          <a:p>
-            <a:pPr lvl="1"/>
-            <a:r>
-              <a:rPr lang="en-US" sz="2400" dirty="0" smtClean="0">
+              <a:t>Text Search</a:t>
+            </a:r>
+          </a:p>
+          <a:p>
+            <a:r>
+              <a:rPr lang="en-US" sz="2800" dirty="0" smtClean="0">
                 <a:latin typeface="Arial Unicode MS" panose="020B0604020202020204" pitchFamily="34" charset="-128"/>
                 <a:ea typeface="Arial Unicode MS" panose="020B0604020202020204" pitchFamily="34" charset="-128"/>
                 <a:cs typeface="Arial Unicode MS" panose="020B0604020202020204" pitchFamily="34" charset="-128"/>
               </a:rPr>
-              <a:t>Strict – will not allow a validation failure</a:t>
-            </a:r>
-          </a:p>
-          <a:p>
-            <a:pPr lvl="1"/>
-            <a:r>
-              <a:rPr lang="en-US" sz="2400" dirty="0" smtClean="0">
+              <a:t>Capped </a:t>
+            </a:r>
+            <a:r>
+              <a:rPr lang="en-US" sz="2800" dirty="0" smtClean="0">
                 <a:latin typeface="Arial Unicode MS" panose="020B0604020202020204" pitchFamily="34" charset="-128"/>
                 <a:ea typeface="Arial Unicode MS" panose="020B0604020202020204" pitchFamily="34" charset="-128"/>
                 <a:cs typeface="Arial Unicode MS" panose="020B0604020202020204" pitchFamily="34" charset="-128"/>
               </a:rPr>
-              <a:t>Moderate – only forces failure if the document is already valid</a:t>
-            </a:r>
-          </a:p>
-          <a:p>
-            <a:endParaRPr lang="en-US" sz="2400" dirty="0">
+              <a:t>Collections</a:t>
+            </a:r>
+          </a:p>
+          <a:p>
+            <a:r>
+              <a:rPr lang="en-US" sz="2800" dirty="0" smtClean="0">
+                <a:latin typeface="Arial Unicode MS" panose="020B0604020202020204" pitchFamily="34" charset="-128"/>
+                <a:ea typeface="Arial Unicode MS" panose="020B0604020202020204" pitchFamily="34" charset="-128"/>
+                <a:cs typeface="Arial Unicode MS" panose="020B0604020202020204" pitchFamily="34" charset="-128"/>
+              </a:rPr>
+              <a:t>Geospatial Indices and Queries</a:t>
+            </a:r>
+            <a:endParaRPr lang="en-US" sz="2800" dirty="0" smtClean="0">
               <a:latin typeface="Arial Unicode MS" panose="020B0604020202020204" pitchFamily="34" charset="-128"/>
               <a:ea typeface="Arial Unicode MS" panose="020B0604020202020204" pitchFamily="34" charset="-128"/>
               <a:cs typeface="Arial Unicode MS" panose="020B0604020202020204" pitchFamily="34" charset="-128"/>
             </a:endParaRPr>
           </a:p>
           <a:p>
-            <a:pPr lvl="1"/>
-            <a:endParaRPr lang="en-US" sz="2400" dirty="0" smtClean="0">
+            <a:r>
+              <a:rPr lang="en-US" sz="2800" dirty="0" smtClean="0">
+                <a:latin typeface="Arial Unicode MS" panose="020B0604020202020204" pitchFamily="34" charset="-128"/>
+                <a:ea typeface="Arial Unicode MS" panose="020B0604020202020204" pitchFamily="34" charset="-128"/>
+                <a:cs typeface="Arial Unicode MS" panose="020B0604020202020204" pitchFamily="34" charset="-128"/>
+              </a:rPr>
+              <a:t>Free </a:t>
+            </a:r>
+            <a:r>
+              <a:rPr lang="en-US" sz="2800" dirty="0" smtClean="0">
+                <a:latin typeface="Arial Unicode MS" panose="020B0604020202020204" pitchFamily="34" charset="-128"/>
+                <a:ea typeface="Arial Unicode MS" panose="020B0604020202020204" pitchFamily="34" charset="-128"/>
+                <a:cs typeface="Arial Unicode MS" panose="020B0604020202020204" pitchFamily="34" charset="-128"/>
+              </a:rPr>
+              <a:t>training </a:t>
+            </a:r>
+            <a:endParaRPr lang="en-US" sz="2800" dirty="0" smtClean="0">
               <a:latin typeface="Arial Unicode MS" panose="020B0604020202020204" pitchFamily="34" charset="-128"/>
               <a:ea typeface="Arial Unicode MS" panose="020B0604020202020204" pitchFamily="34" charset="-128"/>
               <a:cs typeface="Arial Unicode MS" panose="020B0604020202020204" pitchFamily="34" charset="-128"/>
@@ -16970,13 +16858,20 @@
     </p:spTree>
     <p:extLst>
       <p:ext uri="{BB962C8B-B14F-4D97-AF65-F5344CB8AC3E}">
-        <p14:creationId xmlns:p14="http://schemas.microsoft.com/office/powerpoint/2010/main" val="2736834360"/>
+        <p14:creationId xmlns:p14="http://schemas.microsoft.com/office/powerpoint/2010/main" val="3369262683"/>
       </p:ext>
     </p:extLst>
   </p:cSld>
   <p:clrMapOvr>
     <a:masterClrMapping/>
   </p:clrMapOvr>
+  <p:timing>
+    <p:tnLst>
+      <p:par>
+        <p:cTn id="1" dur="indefinite" restart="never" nodeType="tmRoot"/>
+      </p:par>
+    </p:tnLst>
+  </p:timing>
 </p:sld>
 </file>
 
@@ -17013,8 +16908,8 @@
           <a:lstStyle/>
           <a:p>
             <a:r>
-              <a:rPr lang="en-US" dirty="0" smtClean="0"/>
-              <a:t>Validation</a:t>
+              <a:rPr lang="en-US" smtClean="0"/>
+              <a:t>MEAN example</a:t>
             </a:r>
             <a:endParaRPr lang="en-US" dirty="0"/>
           </a:p>
@@ -17032,115 +16927,39 @@
         </p:nvSpPr>
         <p:spPr/>
         <p:txBody>
-          <a:bodyPr>
-            <a:noAutofit/>
-          </a:bodyPr>
+          <a:bodyPr/>
           <a:lstStyle/>
           <a:p>
-            <a:pPr marL="0" indent="0">
-              <a:buNone/>
-            </a:pPr>
-            <a:r>
-              <a:rPr lang="en-US" sz="2800" dirty="0" err="1"/>
-              <a:t>db.createCollection</a:t>
-            </a:r>
-            <a:r>
-              <a:rPr lang="en-US" sz="2800" dirty="0"/>
-              <a:t>( </a:t>
-            </a:r>
-            <a:r>
-              <a:rPr lang="en-US" sz="2800" dirty="0" smtClean="0"/>
-              <a:t>“movies",</a:t>
-            </a:r>
-          </a:p>
-          <a:p>
-            <a:pPr marL="0" indent="0">
-              <a:buNone/>
-            </a:pPr>
-            <a:r>
-              <a:rPr lang="en-US" sz="2800" dirty="0" smtClean="0"/>
-              <a:t>   { </a:t>
-            </a:r>
-            <a:r>
-              <a:rPr lang="en-US" sz="2800" dirty="0"/>
-              <a:t>validator: </a:t>
-            </a:r>
-            <a:r>
-              <a:rPr lang="en-US" sz="2800" dirty="0" smtClean="0"/>
-              <a:t>{ </a:t>
-            </a:r>
-            <a:r>
-              <a:rPr lang="en-US" sz="2800" dirty="0"/>
-              <a:t>$and: </a:t>
-            </a:r>
-          </a:p>
-          <a:p>
-            <a:pPr marL="0" indent="0">
-              <a:buNone/>
-            </a:pPr>
-            <a:r>
-              <a:rPr lang="en-US" sz="2800" dirty="0"/>
-              <a:t>         [ { title: { $type: "string" } }, </a:t>
-            </a:r>
-          </a:p>
-          <a:p>
-            <a:pPr marL="0" indent="0">
-              <a:buNone/>
-            </a:pPr>
-            <a:r>
-              <a:rPr lang="en-US" sz="2800" dirty="0"/>
-              <a:t>            { plot: { $type:  "string"} }, </a:t>
-            </a:r>
-          </a:p>
-          <a:p>
-            <a:pPr marL="0" indent="0">
-              <a:buNone/>
-            </a:pPr>
-            <a:r>
-              <a:rPr lang="en-US" sz="2800" dirty="0"/>
-              <a:t>            </a:t>
-            </a:r>
-            <a:r>
-              <a:rPr lang="en-US" sz="2800" dirty="0" smtClean="0"/>
-              <a:t>{ </a:t>
-            </a:r>
-            <a:r>
-              <a:rPr lang="en-US" sz="2800" dirty="0" err="1" smtClean="0"/>
-              <a:t>imdbRating</a:t>
-            </a:r>
-            <a:r>
-              <a:rPr lang="en-US" sz="2800" dirty="0"/>
-              <a:t>: {$</a:t>
-            </a:r>
-            <a:r>
-              <a:rPr lang="en-US" sz="2800" dirty="0" err="1"/>
-              <a:t>lte</a:t>
-            </a:r>
-            <a:r>
-              <a:rPr lang="en-US" sz="2800" dirty="0"/>
-              <a:t>: 10 } } ]</a:t>
-            </a:r>
-          </a:p>
-          <a:p>
-            <a:pPr marL="0" indent="0">
-              <a:buNone/>
-            </a:pPr>
-            <a:r>
-              <a:rPr lang="en-US" sz="2800" dirty="0" smtClean="0"/>
-              <a:t>    } } )</a:t>
-            </a:r>
-            <a:endParaRPr lang="en-US" sz="2800" dirty="0" smtClean="0">
-              <a:latin typeface="Arial Unicode MS" panose="020B0604020202020204" pitchFamily="34" charset="-128"/>
-              <a:ea typeface="Arial Unicode MS" panose="020B0604020202020204" pitchFamily="34" charset="-128"/>
-              <a:cs typeface="Arial Unicode MS" panose="020B0604020202020204" pitchFamily="34" charset="-128"/>
-            </a:endParaRPr>
+            <a:r>
+              <a:rPr lang="en-US" dirty="0" smtClean="0"/>
+              <a:t>MongoDB</a:t>
+            </a:r>
+          </a:p>
+          <a:p>
+            <a:r>
+              <a:rPr lang="en-US" dirty="0" smtClean="0"/>
+              <a:t>Express</a:t>
+            </a:r>
+          </a:p>
+          <a:p>
+            <a:r>
+              <a:rPr lang="en-US" dirty="0" smtClean="0"/>
+              <a:t>Angular</a:t>
+            </a:r>
+          </a:p>
+          <a:p>
+            <a:r>
+              <a:rPr lang="en-US" dirty="0" smtClean="0"/>
+              <a:t>Node</a:t>
+            </a:r>
+            <a:endParaRPr lang="en-US" dirty="0"/>
           </a:p>
         </p:txBody>
       </p:sp>
     </p:spTree>
     <p:extLst>
       <p:ext uri="{BB962C8B-B14F-4D97-AF65-F5344CB8AC3E}">
-        <p14:creationId xmlns:p14="http://schemas.microsoft.com/office/powerpoint/2010/main" val="3369262683"/>
+        <p14:creationId xmlns:p14="http://schemas.microsoft.com/office/powerpoint/2010/main" val="4160806846"/>
       </p:ext>
     </p:extLst>
   </p:cSld>
@@ -17183,8 +17002,8 @@
           <a:lstStyle/>
           <a:p>
             <a:r>
-              <a:rPr lang="en-US" smtClean="0"/>
-              <a:t>MEAN example</a:t>
+              <a:rPr lang="en-US" dirty="0" smtClean="0"/>
+              <a:t>Angular view</a:t>
             </a:r>
             <a:endParaRPr lang="en-US" dirty="0"/>
           </a:p>
@@ -17202,39 +17021,298 @@
         </p:nvSpPr>
         <p:spPr/>
         <p:txBody>
-          <a:bodyPr/>
+          <a:bodyPr>
+            <a:normAutofit fontScale="92500" lnSpcReduction="10000"/>
+          </a:bodyPr>
           <a:lstStyle/>
           <a:p>
-            <a:r>
-              <a:rPr lang="en-US" dirty="0" smtClean="0"/>
-              <a:t>MongoDB</a:t>
-            </a:r>
-          </a:p>
-          <a:p>
-            <a:r>
-              <a:rPr lang="en-US" dirty="0" smtClean="0"/>
-              <a:t>Express</a:t>
-            </a:r>
-          </a:p>
-          <a:p>
-            <a:r>
-              <a:rPr lang="en-US" dirty="0" smtClean="0"/>
-              <a:t>Angular</a:t>
-            </a:r>
-          </a:p>
-          <a:p>
-            <a:r>
-              <a:rPr lang="en-US" dirty="0" smtClean="0"/>
-              <a:t>Node</a:t>
-            </a:r>
-            <a:endParaRPr lang="en-US" dirty="0"/>
+            <a:pPr marL="0" indent="0">
+              <a:buNone/>
+            </a:pPr>
+            <a:r>
+              <a:rPr lang="en-US" dirty="0"/>
+              <a:t> </a:t>
+            </a:r>
+            <a:r>
+              <a:rPr lang="en-US" sz="2800" dirty="0"/>
+              <a:t>&lt;div </a:t>
+            </a:r>
+            <a:r>
+              <a:rPr lang="en-US" sz="2800" dirty="0" err="1"/>
+              <a:t>ng</a:t>
+            </a:r>
+            <a:r>
+              <a:rPr lang="en-US" sz="2800" dirty="0"/>
+              <a:t>-repeat="</a:t>
+            </a:r>
+            <a:r>
+              <a:rPr lang="en-US" sz="2800" dirty="0" err="1"/>
+              <a:t>todo</a:t>
+            </a:r>
+            <a:r>
+              <a:rPr lang="en-US" sz="2800" dirty="0"/>
+              <a:t> in </a:t>
+            </a:r>
+            <a:r>
+              <a:rPr lang="en-US" sz="2800" dirty="0" err="1"/>
+              <a:t>todos</a:t>
+            </a:r>
+            <a:r>
+              <a:rPr lang="en-US" sz="2800" dirty="0"/>
+              <a:t> | </a:t>
+            </a:r>
+            <a:r>
+              <a:rPr lang="en-US" sz="2800" b="1" dirty="0" err="1"/>
+              <a:t>orderBy</a:t>
+            </a:r>
+            <a:r>
+              <a:rPr lang="en-US" sz="2800" b="1" dirty="0"/>
+              <a:t>: '!</a:t>
+            </a:r>
+            <a:r>
+              <a:rPr lang="en-US" sz="2800" b="1" dirty="0" err="1"/>
+              <a:t>highPriority</a:t>
+            </a:r>
+            <a:r>
+              <a:rPr lang="en-US" sz="2800" b="1" dirty="0" smtClean="0"/>
+              <a:t>'”</a:t>
+            </a:r>
+          </a:p>
+          <a:p>
+            <a:pPr marL="0" indent="0">
+              <a:buNone/>
+            </a:pPr>
+            <a:r>
+              <a:rPr lang="en-US" sz="2800" dirty="0"/>
+              <a:t> </a:t>
+            </a:r>
+            <a:r>
+              <a:rPr lang="en-US" sz="2800" dirty="0" smtClean="0"/>
+              <a:t>  </a:t>
+            </a:r>
+            <a:r>
+              <a:rPr lang="is-IS" sz="2800" dirty="0" smtClean="0"/>
+              <a:t>…</a:t>
+            </a:r>
+            <a:endParaRPr lang="en-US" sz="2800" dirty="0" smtClean="0"/>
+          </a:p>
+          <a:p>
+            <a:pPr marL="0" indent="0">
+              <a:buNone/>
+            </a:pPr>
+            <a:r>
+              <a:rPr lang="en-US" sz="2800" dirty="0"/>
+              <a:t> </a:t>
+            </a:r>
+            <a:r>
+              <a:rPr lang="en-US" sz="2800" dirty="0" smtClean="0"/>
+              <a:t>  &lt;</a:t>
+            </a:r>
+            <a:r>
+              <a:rPr lang="en-US" sz="2800" dirty="0"/>
+              <a:t>div class="col-md-1 col-sm-1 col-xs-1"&gt;</a:t>
+            </a:r>
+          </a:p>
+          <a:p>
+            <a:pPr marL="0" indent="0">
+              <a:buNone/>
+            </a:pPr>
+            <a:r>
+              <a:rPr lang="en-US" sz="2800" dirty="0"/>
+              <a:t>   </a:t>
+            </a:r>
+            <a:r>
+              <a:rPr lang="en-US" sz="2800" dirty="0" smtClean="0"/>
+              <a:t>   &lt;</a:t>
+            </a:r>
+            <a:r>
+              <a:rPr lang="en-US" sz="2800" dirty="0"/>
+              <a:t>span </a:t>
+            </a:r>
+            <a:r>
+              <a:rPr lang="en-US" sz="2800" dirty="0" err="1"/>
+              <a:t>ng</a:t>
+            </a:r>
+            <a:r>
+              <a:rPr lang="en-US" sz="2800" dirty="0"/>
+              <a:t>-class="{'</a:t>
+            </a:r>
+            <a:r>
+              <a:rPr lang="en-US" sz="2800" dirty="0" err="1"/>
+              <a:t>glyphicon</a:t>
+            </a:r>
+            <a:r>
+              <a:rPr lang="en-US" sz="2800" dirty="0"/>
+              <a:t> </a:t>
+            </a:r>
+            <a:r>
+              <a:rPr lang="en-US" sz="2800" dirty="0" err="1"/>
+              <a:t>glyphicon</a:t>
+            </a:r>
+            <a:r>
+              <a:rPr lang="en-US" sz="2800" dirty="0"/>
+              <a:t>-star': </a:t>
+            </a:r>
+            <a:r>
+              <a:rPr lang="en-US" sz="2800" dirty="0" smtClean="0"/>
+              <a:t>  </a:t>
+            </a:r>
+          </a:p>
+          <a:p>
+            <a:pPr marL="0" indent="0">
+              <a:buNone/>
+            </a:pPr>
+            <a:r>
+              <a:rPr lang="en-US" sz="2800" dirty="0"/>
+              <a:t> </a:t>
+            </a:r>
+            <a:r>
+              <a:rPr lang="en-US" sz="2800" dirty="0" smtClean="0"/>
+              <a:t>                                       </a:t>
+            </a:r>
+            <a:r>
+              <a:rPr lang="en-US" sz="2800" dirty="0" err="1" smtClean="0"/>
+              <a:t>todo.highPriority</a:t>
+            </a:r>
+            <a:r>
+              <a:rPr lang="en-US" sz="2800" dirty="0" smtClean="0"/>
+              <a:t>,</a:t>
+            </a:r>
+          </a:p>
+          <a:p>
+            <a:pPr marL="0" indent="0">
+              <a:buNone/>
+            </a:pPr>
+            <a:r>
+              <a:rPr lang="en-US" sz="2800" dirty="0"/>
+              <a:t> </a:t>
+            </a:r>
+            <a:r>
+              <a:rPr lang="en-US" sz="2800" dirty="0" smtClean="0"/>
+              <a:t>                                  </a:t>
+            </a:r>
+            <a:r>
+              <a:rPr lang="en-US" sz="2800" dirty="0"/>
+              <a:t>'</a:t>
+            </a:r>
+            <a:r>
+              <a:rPr lang="en-US" sz="2800" dirty="0" err="1"/>
+              <a:t>glyphicon</a:t>
+            </a:r>
+            <a:r>
+              <a:rPr lang="en-US" sz="2800" dirty="0"/>
+              <a:t> </a:t>
+            </a:r>
+            <a:r>
+              <a:rPr lang="en-US" sz="2800" dirty="0" err="1"/>
+              <a:t>glyphicon</a:t>
+            </a:r>
+            <a:r>
+              <a:rPr lang="en-US" sz="2800" dirty="0"/>
+              <a:t>-star-empty': </a:t>
+            </a:r>
+            <a:endParaRPr lang="en-US" sz="2800" dirty="0" smtClean="0"/>
+          </a:p>
+          <a:p>
+            <a:pPr marL="0" indent="0">
+              <a:buNone/>
+            </a:pPr>
+            <a:r>
+              <a:rPr lang="en-US" sz="2800" dirty="0"/>
+              <a:t> </a:t>
+            </a:r>
+            <a:r>
+              <a:rPr lang="en-US" sz="2800" dirty="0" smtClean="0"/>
+              <a:t>                                      !</a:t>
+            </a:r>
+            <a:r>
+              <a:rPr lang="en-US" sz="2800" dirty="0" err="1"/>
+              <a:t>todo.highPriority</a:t>
+            </a:r>
+            <a:r>
+              <a:rPr lang="en-US" sz="2800" dirty="0" smtClean="0"/>
+              <a:t>}” </a:t>
+            </a:r>
+            <a:endParaRPr lang="en-US" sz="2800" dirty="0"/>
+          </a:p>
+          <a:p>
+            <a:pPr marL="0" indent="0">
+              <a:buNone/>
+            </a:pPr>
+            <a:r>
+              <a:rPr lang="en-US" sz="2800" dirty="0" smtClean="0"/>
+              <a:t>        </a:t>
+            </a:r>
+            <a:r>
+              <a:rPr lang="en-US" sz="2800" dirty="0" err="1"/>
+              <a:t>ng</a:t>
+            </a:r>
+            <a:r>
+              <a:rPr lang="en-US" sz="2800" dirty="0"/>
+              <a:t>-click=</a:t>
+            </a:r>
+            <a:r>
+              <a:rPr lang="en-US" sz="2800" b="1" dirty="0"/>
+              <a:t>"</a:t>
+            </a:r>
+            <a:r>
+              <a:rPr lang="en-US" sz="2800" b="1" dirty="0" err="1"/>
+              <a:t>updatePriority</a:t>
+            </a:r>
+            <a:r>
+              <a:rPr lang="en-US" sz="2800" b="1" dirty="0"/>
+              <a:t>($event, </a:t>
+            </a:r>
+            <a:r>
+              <a:rPr lang="en-US" sz="2800" b="1" dirty="0" err="1"/>
+              <a:t>todo</a:t>
+            </a:r>
+            <a:r>
+              <a:rPr lang="en-US" sz="2800" b="1" dirty="0"/>
+              <a:t>)"</a:t>
+            </a:r>
+            <a:r>
+              <a:rPr lang="en-US" sz="2800" dirty="0" smtClean="0"/>
+              <a:t>&gt;</a:t>
+            </a:r>
+          </a:p>
+          <a:p>
+            <a:pPr marL="0" indent="0">
+              <a:buNone/>
+            </a:pPr>
+            <a:r>
+              <a:rPr lang="en-US" sz="2800" dirty="0"/>
+              <a:t> </a:t>
+            </a:r>
+            <a:r>
+              <a:rPr lang="en-US" sz="2800" dirty="0" smtClean="0"/>
+              <a:t>     &lt;</a:t>
+            </a:r>
+            <a:r>
+              <a:rPr lang="en-US" sz="2800" dirty="0"/>
+              <a:t>/</a:t>
+            </a:r>
+            <a:r>
+              <a:rPr lang="en-US" sz="2800" dirty="0" smtClean="0"/>
+              <a:t>span&gt;</a:t>
+            </a:r>
+          </a:p>
+          <a:p>
+            <a:pPr marL="0" indent="0">
+              <a:buNone/>
+            </a:pPr>
+            <a:r>
+              <a:rPr lang="en-US" sz="2800" dirty="0" smtClean="0"/>
+              <a:t>   &lt;/div&gt;</a:t>
+            </a:r>
+            <a:endParaRPr lang="en-US" sz="2800" dirty="0"/>
           </a:p>
         </p:txBody>
       </p:sp>
     </p:spTree>
     <p:extLst>
       <p:ext uri="{BB962C8B-B14F-4D97-AF65-F5344CB8AC3E}">
-        <p14:creationId xmlns:p14="http://schemas.microsoft.com/office/powerpoint/2010/main" val="4160806846"/>
+        <p14:creationId xmlns:p14="http://schemas.microsoft.com/office/powerpoint/2010/main" val="3701272946"/>
       </p:ext>
     </p:extLst>
   </p:cSld>
@@ -17278,7 +17356,7 @@
           <a:p>
             <a:r>
               <a:rPr lang="en-US" dirty="0" smtClean="0"/>
-              <a:t>Angular view</a:t>
+              <a:t>Angular Controller</a:t>
             </a:r>
             <a:endParaRPr lang="en-US" dirty="0"/>
           </a:p>
@@ -17297,7 +17375,7 @@
         <p:spPr/>
         <p:txBody>
           <a:bodyPr>
-            <a:normAutofit fontScale="92500" lnSpcReduction="10000"/>
+            <a:normAutofit fontScale="70000" lnSpcReduction="20000"/>
           </a:bodyPr>
           <a:lstStyle/>
           <a:p>
@@ -17306,294 +17384,278 @@
             </a:pPr>
             <a:r>
               <a:rPr lang="en-US" dirty="0"/>
+              <a:t>$</a:t>
+            </a:r>
+            <a:r>
+              <a:rPr lang="en-US" dirty="0" err="1"/>
+              <a:t>scope.updatePriority</a:t>
+            </a:r>
+            <a:r>
+              <a:rPr lang="en-US" dirty="0"/>
+              <a:t> = </a:t>
+            </a:r>
+            <a:r>
+              <a:rPr lang="en-US" b="1" dirty="0"/>
+              <a:t>function</a:t>
+            </a:r>
+            <a:r>
+              <a:rPr lang="en-US" dirty="0"/>
+              <a:t>($event, _t) {</a:t>
+            </a:r>
+            <a:br>
+              <a:rPr lang="en-US" dirty="0"/>
+            </a:br>
+            <a:r>
+              <a:rPr lang="en-US" dirty="0"/>
+              <a:t>  </a:t>
+            </a:r>
+            <a:r>
+              <a:rPr lang="en-US" b="1" dirty="0" err="1"/>
+              <a:t>var</a:t>
+            </a:r>
+            <a:r>
+              <a:rPr lang="en-US" b="1" dirty="0"/>
               <a:t> </a:t>
             </a:r>
             <a:r>
-              <a:rPr lang="en-US" sz="2800" dirty="0"/>
-              <a:t>&lt;div </a:t>
-            </a:r>
-            <a:r>
-              <a:rPr lang="en-US" sz="2800" dirty="0" err="1"/>
-              <a:t>ng</a:t>
-            </a:r>
-            <a:r>
-              <a:rPr lang="en-US" sz="2800" dirty="0"/>
-              <a:t>-repeat="</a:t>
-            </a:r>
-            <a:r>
-              <a:rPr lang="en-US" sz="2800" dirty="0" err="1"/>
+              <a:rPr lang="en-US" dirty="0" err="1"/>
+              <a:t>cbk</a:t>
+            </a:r>
+            <a:r>
+              <a:rPr lang="en-US" dirty="0"/>
+              <a:t> = !_</a:t>
+            </a:r>
+            <a:r>
+              <a:rPr lang="en-US" dirty="0" err="1"/>
+              <a:t>t.highPriority</a:t>
+            </a:r>
+            <a:r>
+              <a:rPr lang="en-US" dirty="0"/>
+              <a:t>;</a:t>
+            </a:r>
+            <a:br>
+              <a:rPr lang="en-US" dirty="0"/>
+            </a:br>
+            <a:r>
+              <a:rPr lang="en-US" dirty="0"/>
+              <a:t>  </a:t>
+            </a:r>
+            <a:r>
+              <a:rPr lang="en-US" dirty="0" err="1"/>
+              <a:t>todosFactory.updateTodo</a:t>
+            </a:r>
+            <a:r>
+              <a:rPr lang="en-US" dirty="0"/>
+              <a:t>({</a:t>
+            </a:r>
+            <a:br>
+              <a:rPr lang="en-US" dirty="0"/>
+            </a:br>
+            <a:r>
+              <a:rPr lang="en-US" dirty="0"/>
+              <a:t>    _id: _</a:t>
+            </a:r>
+            <a:r>
+              <a:rPr lang="en-US" dirty="0" err="1"/>
+              <a:t>t._id</a:t>
+            </a:r>
+            <a:r>
+              <a:rPr lang="en-US" dirty="0"/>
+              <a:t>,</a:t>
+            </a:r>
+            <a:br>
+              <a:rPr lang="en-US" dirty="0"/>
+            </a:br>
+            <a:r>
+              <a:rPr lang="en-US" dirty="0"/>
+              <a:t>    </a:t>
+            </a:r>
+            <a:r>
+              <a:rPr lang="en-US" dirty="0" err="1"/>
+              <a:t>highPriority</a:t>
+            </a:r>
+            <a:r>
+              <a:rPr lang="en-US" dirty="0"/>
+              <a:t>: </a:t>
+            </a:r>
+            <a:r>
+              <a:rPr lang="en-US" dirty="0" err="1"/>
+              <a:t>cbk</a:t>
+            </a:r>
+            <a:r>
+              <a:rPr lang="en-US" dirty="0"/>
+              <a:t>,</a:t>
+            </a:r>
+            <a:br>
+              <a:rPr lang="en-US" dirty="0"/>
+            </a:br>
+            <a:r>
+              <a:rPr lang="en-US" dirty="0"/>
+              <a:t>    </a:t>
+            </a:r>
+            <a:r>
+              <a:rPr lang="en-US" dirty="0" err="1"/>
+              <a:t>isCompleted</a:t>
+            </a:r>
+            <a:r>
+              <a:rPr lang="en-US" dirty="0"/>
+              <a:t>: _</a:t>
+            </a:r>
+            <a:r>
+              <a:rPr lang="en-US" dirty="0" err="1"/>
+              <a:t>t.isCompleted</a:t>
+            </a:r>
+            <a:r>
+              <a:rPr lang="en-US" dirty="0"/>
+              <a:t>,</a:t>
+            </a:r>
+            <a:br>
+              <a:rPr lang="en-US" dirty="0"/>
+            </a:br>
+            <a:r>
+              <a:rPr lang="en-US" dirty="0"/>
+              <a:t>    </a:t>
+            </a:r>
+            <a:r>
+              <a:rPr lang="en-US" dirty="0" err="1"/>
               <a:t>todo</a:t>
             </a:r>
             <a:r>
-              <a:rPr lang="en-US" sz="2800" dirty="0"/>
-              <a:t> in </a:t>
-            </a:r>
-            <a:r>
-              <a:rPr lang="en-US" sz="2800" dirty="0" err="1"/>
-              <a:t>todos</a:t>
-            </a:r>
-            <a:r>
-              <a:rPr lang="en-US" sz="2800" dirty="0"/>
-              <a:t> | </a:t>
-            </a:r>
-            <a:r>
-              <a:rPr lang="en-US" sz="2800" b="1" dirty="0" err="1"/>
-              <a:t>orderBy</a:t>
-            </a:r>
-            <a:r>
-              <a:rPr lang="en-US" sz="2800" b="1" dirty="0"/>
-              <a:t>: '!</a:t>
-            </a:r>
-            <a:r>
-              <a:rPr lang="en-US" sz="2800" b="1" dirty="0" err="1"/>
-              <a:t>highPriority</a:t>
-            </a:r>
-            <a:r>
-              <a:rPr lang="en-US" sz="2800" b="1" dirty="0" smtClean="0"/>
-              <a:t>'”</a:t>
-            </a:r>
-          </a:p>
-          <a:p>
-            <a:pPr marL="0" indent="0">
-              <a:buNone/>
-            </a:pPr>
-            <a:r>
-              <a:rPr lang="en-US" sz="2800" dirty="0"/>
-              <a:t> </a:t>
-            </a:r>
-            <a:r>
-              <a:rPr lang="en-US" sz="2800" dirty="0" smtClean="0"/>
-              <a:t>  </a:t>
-            </a:r>
-            <a:r>
-              <a:rPr lang="is-IS" sz="2800" dirty="0" smtClean="0"/>
-              <a:t>…</a:t>
-            </a:r>
-            <a:endParaRPr lang="en-US" sz="2800" dirty="0" smtClean="0"/>
-          </a:p>
-          <a:p>
-            <a:pPr marL="0" indent="0">
-              <a:buNone/>
-            </a:pPr>
-            <a:r>
-              <a:rPr lang="en-US" sz="2800" dirty="0"/>
-              <a:t> </a:t>
-            </a:r>
-            <a:r>
-              <a:rPr lang="en-US" sz="2800" dirty="0" smtClean="0"/>
-              <a:t>  &lt;</a:t>
-            </a:r>
-            <a:r>
-              <a:rPr lang="en-US" sz="2800" dirty="0"/>
-              <a:t>div class="col-md-1 col-sm-1 col-xs-1"&gt;</a:t>
-            </a:r>
-          </a:p>
-          <a:p>
-            <a:pPr marL="0" indent="0">
-              <a:buNone/>
-            </a:pPr>
-            <a:r>
-              <a:rPr lang="en-US" sz="2800" dirty="0"/>
-              <a:t>   </a:t>
-            </a:r>
-            <a:r>
-              <a:rPr lang="en-US" sz="2800" dirty="0" smtClean="0"/>
-              <a:t>   &lt;</a:t>
-            </a:r>
-            <a:r>
-              <a:rPr lang="en-US" sz="2800" dirty="0"/>
-              <a:t>span </a:t>
-            </a:r>
-            <a:r>
-              <a:rPr lang="en-US" sz="2800" dirty="0" err="1"/>
-              <a:t>ng</a:t>
-            </a:r>
-            <a:r>
-              <a:rPr lang="en-US" sz="2800" dirty="0"/>
-              <a:t>-class="{'</a:t>
-            </a:r>
-            <a:r>
-              <a:rPr lang="en-US" sz="2800" dirty="0" err="1"/>
-              <a:t>glyphicon</a:t>
-            </a:r>
-            <a:r>
-              <a:rPr lang="en-US" sz="2800" dirty="0"/>
-              <a:t> </a:t>
-            </a:r>
-            <a:r>
-              <a:rPr lang="en-US" sz="2800" dirty="0" err="1"/>
-              <a:t>glyphicon</a:t>
-            </a:r>
-            <a:r>
-              <a:rPr lang="en-US" sz="2800" dirty="0"/>
-              <a:t>-star': </a:t>
-            </a:r>
-            <a:r>
-              <a:rPr lang="en-US" sz="2800" dirty="0" smtClean="0"/>
-              <a:t>  </a:t>
-            </a:r>
-          </a:p>
-          <a:p>
-            <a:pPr marL="0" indent="0">
-              <a:buNone/>
-            </a:pPr>
-            <a:r>
-              <a:rPr lang="en-US" sz="2800" dirty="0"/>
-              <a:t> </a:t>
-            </a:r>
-            <a:r>
-              <a:rPr lang="en-US" sz="2800" dirty="0" smtClean="0"/>
-              <a:t>                                       </a:t>
-            </a:r>
-            <a:r>
-              <a:rPr lang="en-US" sz="2800" dirty="0" err="1" smtClean="0"/>
-              <a:t>todo.highPriority</a:t>
-            </a:r>
-            <a:r>
-              <a:rPr lang="en-US" sz="2800" dirty="0" smtClean="0"/>
-              <a:t>,</a:t>
-            </a:r>
-          </a:p>
-          <a:p>
-            <a:pPr marL="0" indent="0">
-              <a:buNone/>
-            </a:pPr>
-            <a:r>
-              <a:rPr lang="en-US" sz="2800" dirty="0"/>
-              <a:t> </a:t>
-            </a:r>
-            <a:r>
-              <a:rPr lang="en-US" sz="2800" dirty="0" smtClean="0"/>
-              <a:t>                                  </a:t>
-            </a:r>
-            <a:r>
-              <a:rPr lang="en-US" sz="2800" dirty="0"/>
-              <a:t>'</a:t>
-            </a:r>
-            <a:r>
-              <a:rPr lang="en-US" sz="2800" dirty="0" err="1"/>
-              <a:t>glyphicon</a:t>
-            </a:r>
-            <a:r>
-              <a:rPr lang="en-US" sz="2800" dirty="0"/>
-              <a:t> </a:t>
-            </a:r>
-            <a:r>
-              <a:rPr lang="en-US" sz="2800" dirty="0" err="1"/>
-              <a:t>glyphicon</a:t>
-            </a:r>
-            <a:r>
-              <a:rPr lang="en-US" sz="2800" dirty="0"/>
-              <a:t>-star-empty': </a:t>
-            </a:r>
-            <a:endParaRPr lang="en-US" sz="2800" dirty="0" smtClean="0"/>
-          </a:p>
-          <a:p>
-            <a:pPr marL="0" indent="0">
-              <a:buNone/>
-            </a:pPr>
-            <a:r>
-              <a:rPr lang="en-US" sz="2800" dirty="0"/>
-              <a:t> </a:t>
-            </a:r>
-            <a:r>
-              <a:rPr lang="en-US" sz="2800" dirty="0" smtClean="0"/>
-              <a:t>                                      !</a:t>
-            </a:r>
-            <a:r>
-              <a:rPr lang="en-US" sz="2800" dirty="0" err="1"/>
-              <a:t>todo.highPriority</a:t>
-            </a:r>
-            <a:r>
-              <a:rPr lang="en-US" sz="2800" dirty="0" smtClean="0"/>
-              <a:t>}” </a:t>
-            </a:r>
-            <a:endParaRPr lang="en-US" sz="2800" dirty="0"/>
-          </a:p>
-          <a:p>
-            <a:pPr marL="0" indent="0">
-              <a:buNone/>
-            </a:pPr>
-            <a:r>
-              <a:rPr lang="en-US" sz="2800" dirty="0" smtClean="0"/>
-              <a:t>        </a:t>
-            </a:r>
-            <a:r>
-              <a:rPr lang="en-US" sz="2800" dirty="0" err="1"/>
-              <a:t>ng</a:t>
-            </a:r>
-            <a:r>
-              <a:rPr lang="en-US" sz="2800" dirty="0"/>
-              <a:t>-click=</a:t>
-            </a:r>
-            <a:r>
-              <a:rPr lang="en-US" sz="2800" b="1" dirty="0"/>
-              <a:t>"</a:t>
-            </a:r>
-            <a:r>
-              <a:rPr lang="en-US" sz="2800" b="1" dirty="0" err="1"/>
-              <a:t>updatePriority</a:t>
-            </a:r>
-            <a:r>
-              <a:rPr lang="en-US" sz="2800" b="1" dirty="0"/>
-              <a:t>($event, </a:t>
-            </a:r>
-            <a:r>
-              <a:rPr lang="en-US" sz="2800" b="1" dirty="0" err="1"/>
-              <a:t>todo</a:t>
-            </a:r>
-            <a:r>
-              <a:rPr lang="en-US" sz="2800" b="1" dirty="0"/>
-              <a:t>)"</a:t>
-            </a:r>
-            <a:r>
-              <a:rPr lang="en-US" sz="2800" dirty="0" smtClean="0"/>
-              <a:t>&gt;</a:t>
-            </a:r>
-          </a:p>
-          <a:p>
-            <a:pPr marL="0" indent="0">
-              <a:buNone/>
-            </a:pPr>
-            <a:r>
-              <a:rPr lang="en-US" sz="2800" dirty="0"/>
-              <a:t> </a:t>
-            </a:r>
-            <a:r>
-              <a:rPr lang="en-US" sz="2800" dirty="0" smtClean="0"/>
-              <a:t>     &lt;</a:t>
-            </a:r>
-            <a:r>
-              <a:rPr lang="en-US" sz="2800" dirty="0"/>
-              <a:t>/</a:t>
-            </a:r>
-            <a:r>
-              <a:rPr lang="en-US" sz="2800" dirty="0" smtClean="0"/>
-              <a:t>span&gt;</a:t>
-            </a:r>
-          </a:p>
-          <a:p>
-            <a:pPr marL="0" indent="0">
-              <a:buNone/>
-            </a:pPr>
-            <a:r>
-              <a:rPr lang="en-US" sz="2800" dirty="0" smtClean="0"/>
-              <a:t>   &lt;/div&gt;</a:t>
-            </a:r>
-            <a:endParaRPr lang="en-US" sz="2800" dirty="0"/>
+              <a:rPr lang="en-US" dirty="0"/>
+              <a:t>: _</a:t>
+            </a:r>
+            <a:r>
+              <a:rPr lang="en-US" dirty="0" err="1"/>
+              <a:t>t.todo</a:t>
+            </a:r>
+            <a:r>
+              <a:rPr lang="en-US" dirty="0"/>
+              <a:t/>
+            </a:r>
+            <a:br>
+              <a:rPr lang="en-US" dirty="0"/>
+            </a:br>
+            <a:r>
+              <a:rPr lang="en-US" dirty="0"/>
+              <a:t>  }).then(</a:t>
+            </a:r>
+            <a:r>
+              <a:rPr lang="en-US" b="1" dirty="0"/>
+              <a:t>function</a:t>
+            </a:r>
+            <a:r>
+              <a:rPr lang="en-US" dirty="0"/>
+              <a:t>(data) {</a:t>
+            </a:r>
+            <a:br>
+              <a:rPr lang="en-US" dirty="0"/>
+            </a:br>
+            <a:r>
+              <a:rPr lang="en-US" dirty="0"/>
+              <a:t>    </a:t>
+            </a:r>
+            <a:r>
+              <a:rPr lang="en-US" b="1" dirty="0"/>
+              <a:t>if </a:t>
+            </a:r>
+            <a:r>
+              <a:rPr lang="en-US" dirty="0"/>
+              <a:t>(</a:t>
+            </a:r>
+            <a:r>
+              <a:rPr lang="en-US" dirty="0" err="1"/>
+              <a:t>data.data.ok</a:t>
+            </a:r>
+            <a:r>
+              <a:rPr lang="en-US" dirty="0"/>
+              <a:t>) {</a:t>
+            </a:r>
+            <a:br>
+              <a:rPr lang="en-US" dirty="0"/>
+            </a:br>
+            <a:r>
+              <a:rPr lang="en-US" dirty="0"/>
+              <a:t>      _</a:t>
+            </a:r>
+            <a:r>
+              <a:rPr lang="en-US" dirty="0" err="1"/>
+              <a:t>t.highPriority</a:t>
+            </a:r>
+            <a:r>
+              <a:rPr lang="en-US" dirty="0"/>
+              <a:t> = </a:t>
+            </a:r>
+            <a:r>
+              <a:rPr lang="en-US" dirty="0" err="1"/>
+              <a:t>cbk</a:t>
+            </a:r>
+            <a:r>
+              <a:rPr lang="en-US" dirty="0"/>
+              <a:t>;</a:t>
+            </a:r>
+            <a:br>
+              <a:rPr lang="en-US" dirty="0"/>
+            </a:br>
+            <a:r>
+              <a:rPr lang="en-US" dirty="0"/>
+              <a:t>    } </a:t>
+            </a:r>
+            <a:r>
+              <a:rPr lang="en-US" b="1" dirty="0"/>
+              <a:t>else </a:t>
+            </a:r>
+            <a:r>
+              <a:rPr lang="en-US" dirty="0"/>
+              <a:t>{</a:t>
+            </a:r>
+            <a:br>
+              <a:rPr lang="en-US" dirty="0"/>
+            </a:br>
+            <a:r>
+              <a:rPr lang="en-US" dirty="0"/>
+              <a:t>      alert('Oops something went wrong!');</a:t>
+            </a:r>
+            <a:br>
+              <a:rPr lang="en-US" dirty="0"/>
+            </a:br>
+            <a:r>
+              <a:rPr lang="en-US" dirty="0"/>
+              <a:t>    }</a:t>
+            </a:r>
+            <a:br>
+              <a:rPr lang="en-US" dirty="0"/>
+            </a:br>
+            <a:r>
+              <a:rPr lang="en-US" dirty="0"/>
+              <a:t>  });</a:t>
+            </a:r>
+            <a:br>
+              <a:rPr lang="en-US" dirty="0"/>
+            </a:br>
+            <a:r>
+              <a:rPr lang="en-US" dirty="0"/>
+              <a:t>};</a:t>
+            </a:r>
           </a:p>
         </p:txBody>
       </p:sp>
     </p:spTree>
     <p:extLst>
       <p:ext uri="{BB962C8B-B14F-4D97-AF65-F5344CB8AC3E}">
-        <p14:creationId xmlns:p14="http://schemas.microsoft.com/office/powerpoint/2010/main" val="3701272946"/>
+        <p14:creationId xmlns:p14="http://schemas.microsoft.com/office/powerpoint/2010/main" val="2445364700"/>
       </p:ext>
     </p:extLst>
   </p:cSld>
   <p:clrMapOvr>
     <a:masterClrMapping/>
   </p:clrMapOvr>
+  <p:timing>
+    <p:tnLst>
+      <p:par>
+        <p:cTn id="1" dur="indefinite" restart="never" nodeType="tmRoot"/>
+      </p:par>
+    </p:tnLst>
+  </p:timing>
 </p:sld>
 </file>
 
@@ -17631,7 +17693,7 @@
           <a:p>
             <a:r>
               <a:rPr lang="en-US" dirty="0" smtClean="0"/>
-              <a:t>Angular Controller</a:t>
+              <a:t>Express Server</a:t>
             </a:r>
             <a:endParaRPr lang="en-US" dirty="0"/>
           </a:p>
@@ -17650,7 +17712,7 @@
         <p:spPr/>
         <p:txBody>
           <a:bodyPr>
-            <a:normAutofit fontScale="70000" lnSpcReduction="20000"/>
+            <a:normAutofit fontScale="85000" lnSpcReduction="20000"/>
           </a:bodyPr>
           <a:lstStyle/>
           <a:p>
@@ -17659,257 +17721,197 @@
             </a:pPr>
             <a:r>
               <a:rPr lang="en-US" dirty="0"/>
-              <a:t>$</a:t>
+              <a:t> </a:t>
             </a:r>
             <a:r>
               <a:rPr lang="en-US" dirty="0" err="1"/>
-              <a:t>scope.updatePriority</a:t>
+              <a:t>router.put</a:t>
             </a:r>
             <a:r>
               <a:rPr lang="en-US" dirty="0"/>
-              <a:t> = </a:t>
-            </a:r>
-            <a:r>
-              <a:rPr lang="en-US" b="1" dirty="0"/>
-              <a:t>function</a:t>
+              <a:t>('/</a:t>
+            </a:r>
+            <a:r>
+              <a:rPr lang="en-US" dirty="0" err="1"/>
+              <a:t>api</a:t>
             </a:r>
             <a:r>
               <a:rPr lang="en-US" dirty="0"/>
-              <a:t>($event, _t) {</a:t>
-            </a:r>
-            <a:br>
+              <a:t>/</a:t>
+            </a:r>
+            <a:r>
+              <a:rPr lang="en-US" dirty="0" err="1"/>
+              <a:t>todos</a:t>
+            </a:r>
+            <a:r>
               <a:rPr lang="en-US" dirty="0"/>
-            </a:br>
+              <a:t>', function(</a:t>
+            </a:r>
+            <a:r>
+              <a:rPr lang="en-US" dirty="0" err="1"/>
+              <a:t>req</a:t>
+            </a:r>
             <a:r>
               <a:rPr lang="en-US" dirty="0"/>
-              <a:t>  </a:t>
-            </a:r>
-            <a:r>
-              <a:rPr lang="en-US" b="1" dirty="0" err="1"/>
+              <a:t>, res) {</a:t>
+            </a:r>
+          </a:p>
+          <a:p>
+            <a:pPr marL="0" indent="0">
+              <a:buNone/>
+            </a:pPr>
+            <a:r>
+              <a:rPr lang="en-US" dirty="0"/>
+              <a:t>    </a:t>
+            </a:r>
+            <a:r>
+              <a:rPr lang="en-US" dirty="0" err="1"/>
               <a:t>var</a:t>
+            </a:r>
+            <a:r>
+              <a:rPr lang="en-US" dirty="0"/>
+              <a:t> id = </a:t>
+            </a:r>
+            <a:r>
+              <a:rPr lang="en-US" dirty="0" err="1"/>
+              <a:t>req.body._id</a:t>
+            </a:r>
+            <a:r>
+              <a:rPr lang="en-US" dirty="0"/>
+              <a:t>;</a:t>
+            </a:r>
+          </a:p>
+          <a:p>
+            <a:pPr marL="0" indent="0">
+              <a:buNone/>
+            </a:pPr>
+            <a:r>
+              <a:rPr lang="en-US" dirty="0"/>
+              <a:t>    delete </a:t>
+            </a:r>
+            <a:r>
+              <a:rPr lang="en-US" dirty="0" err="1"/>
+              <a:t>req.body</a:t>
+            </a:r>
+            <a:r>
+              <a:rPr lang="en-US" dirty="0"/>
+              <a:t>["_id"];</a:t>
+            </a:r>
+          </a:p>
+          <a:p>
+            <a:pPr marL="0" indent="0">
+              <a:buNone/>
+            </a:pPr>
+            <a:r>
+              <a:rPr lang="en-US" dirty="0"/>
+              <a:t>   </a:t>
             </a:r>
             <a:r>
               <a:rPr lang="en-US" b="1" dirty="0"/>
               <a:t> </a:t>
             </a:r>
             <a:r>
+              <a:rPr lang="en-US" b="1" dirty="0" err="1"/>
+              <a:t>db.todos.update</a:t>
+            </a:r>
+            <a:r>
+              <a:rPr lang="en-US" b="1" dirty="0"/>
+              <a:t>({</a:t>
+            </a:r>
+          </a:p>
+          <a:p>
+            <a:pPr marL="0" indent="0">
+              <a:buNone/>
+            </a:pPr>
+            <a:r>
+              <a:rPr lang="en-US" b="1" dirty="0"/>
+              <a:t>      _id: </a:t>
+            </a:r>
+            <a:r>
+              <a:rPr lang="en-US" b="1" dirty="0" err="1"/>
+              <a:t>mongojs.ObjectId</a:t>
+            </a:r>
+            <a:r>
+              <a:rPr lang="en-US" b="1" dirty="0"/>
+              <a:t>(id)</a:t>
+            </a:r>
+          </a:p>
+          <a:p>
+            <a:pPr marL="0" indent="0">
+              <a:buNone/>
+            </a:pPr>
+            <a:r>
+              <a:rPr lang="en-US" b="1" dirty="0"/>
+              <a:t>    }, </a:t>
+            </a:r>
+            <a:r>
+              <a:rPr lang="en-US" b="1" dirty="0" err="1"/>
+              <a:t>req.body</a:t>
+            </a:r>
+            <a:r>
+              <a:rPr lang="en-US" b="1" dirty="0"/>
+              <a:t>, </a:t>
+            </a:r>
+            <a:r>
+              <a:rPr lang="en-US" dirty="0"/>
+              <a:t>{}, function(err, data) </a:t>
+            </a:r>
+            <a:r>
+              <a:rPr lang="en-US" dirty="0" smtClean="0"/>
+              <a:t>{</a:t>
+            </a:r>
+            <a:endParaRPr lang="en-US" dirty="0"/>
+          </a:p>
+          <a:p>
+            <a:pPr marL="0" indent="0">
+              <a:buNone/>
+            </a:pPr>
+            <a:r>
+              <a:rPr lang="en-US" dirty="0"/>
+              <a:t>      </a:t>
+            </a:r>
+            <a:r>
               <a:rPr lang="en-US" dirty="0" err="1"/>
-              <a:t>cbk</a:t>
+              <a:t>res.json</a:t>
             </a:r>
             <a:r>
               <a:rPr lang="en-US" dirty="0"/>
-              <a:t> = !_</a:t>
+              <a:t>(data);</a:t>
+            </a:r>
+          </a:p>
+          <a:p>
+            <a:pPr marL="0" indent="0">
+              <a:buNone/>
+            </a:pPr>
+            <a:r>
+              <a:rPr lang="en-US" dirty="0"/>
+              <a:t>      </a:t>
             </a:r>
             <a:r>
               <a:rPr lang="en-US" dirty="0" err="1"/>
-              <a:t>t.highPriority</a:t>
+              <a:t>req.body</a:t>
             </a:r>
             <a:r>
               <a:rPr lang="en-US" dirty="0"/>
-              <a:t>;</a:t>
-            </a:r>
-            <a:br>
+              <a:t>["_id"] = id;</a:t>
+            </a:r>
+          </a:p>
+          <a:p>
+            <a:pPr marL="0" indent="0">
+              <a:buNone/>
+            </a:pPr>
+            <a:r>
               <a:rPr lang="en-US" dirty="0"/>
-            </a:br>
-            <a:r>
-              <a:rPr lang="en-US" dirty="0"/>
-              <a:t>  </a:t>
-            </a:r>
-            <a:r>
-              <a:rPr lang="en-US" dirty="0" err="1"/>
-              <a:t>todosFactory.updateTodo</a:t>
-            </a:r>
-            <a:r>
-              <a:rPr lang="en-US" dirty="0"/>
-              <a:t>({</a:t>
-            </a:r>
-            <a:br>
-              <a:rPr lang="en-US" dirty="0"/>
-            </a:br>
-            <a:r>
-              <a:rPr lang="en-US" dirty="0"/>
-              <a:t>    _id: _</a:t>
-            </a:r>
-            <a:r>
-              <a:rPr lang="en-US" dirty="0" err="1"/>
-              <a:t>t._id</a:t>
-            </a:r>
-            <a:r>
-              <a:rPr lang="en-US" dirty="0"/>
-              <a:t>,</a:t>
-            </a:r>
-            <a:br>
-              <a:rPr lang="en-US" dirty="0"/>
-            </a:br>
-            <a:r>
-              <a:rPr lang="en-US" dirty="0"/>
-              <a:t>    </a:t>
-            </a:r>
-            <a:r>
-              <a:rPr lang="en-US" dirty="0" err="1"/>
-              <a:t>highPriority</a:t>
-            </a:r>
-            <a:r>
-              <a:rPr lang="en-US" dirty="0"/>
-              <a:t>: </a:t>
-            </a:r>
-            <a:r>
-              <a:rPr lang="en-US" dirty="0" err="1"/>
-              <a:t>cbk</a:t>
-            </a:r>
-            <a:r>
-              <a:rPr lang="en-US" dirty="0"/>
-              <a:t>,</a:t>
-            </a:r>
-            <a:br>
-              <a:rPr lang="en-US" dirty="0"/>
-            </a:br>
-            <a:r>
-              <a:rPr lang="en-US" dirty="0"/>
-              <a:t>    </a:t>
-            </a:r>
-            <a:r>
-              <a:rPr lang="en-US" dirty="0" err="1"/>
-              <a:t>isCompleted</a:t>
-            </a:r>
-            <a:r>
-              <a:rPr lang="en-US" dirty="0"/>
-              <a:t>: _</a:t>
-            </a:r>
-            <a:r>
-              <a:rPr lang="en-US" dirty="0" err="1"/>
-              <a:t>t.isCompleted</a:t>
-            </a:r>
-            <a:r>
-              <a:rPr lang="en-US" dirty="0"/>
-              <a:t>,</a:t>
-            </a:r>
-            <a:br>
-              <a:rPr lang="en-US" dirty="0"/>
-            </a:br>
-            <a:r>
-              <a:rPr lang="en-US" dirty="0"/>
-              <a:t>    </a:t>
-            </a:r>
-            <a:r>
-              <a:rPr lang="en-US" dirty="0" err="1"/>
-              <a:t>todo</a:t>
-            </a:r>
-            <a:r>
-              <a:rPr lang="en-US" dirty="0"/>
-              <a:t>: _</a:t>
-            </a:r>
-            <a:r>
-              <a:rPr lang="en-US" dirty="0" err="1"/>
-              <a:t>t.todo</a:t>
-            </a:r>
-            <a:r>
-              <a:rPr lang="en-US" dirty="0"/>
-              <a:t/>
-            </a:r>
-            <a:br>
-              <a:rPr lang="en-US" dirty="0"/>
-            </a:br>
-            <a:r>
-              <a:rPr lang="en-US" dirty="0"/>
-              <a:t>  }).then(</a:t>
-            </a:r>
-            <a:r>
-              <a:rPr lang="en-US" b="1" dirty="0"/>
-              <a:t>function</a:t>
-            </a:r>
-            <a:r>
-              <a:rPr lang="en-US" dirty="0"/>
-              <a:t>(data) {</a:t>
-            </a:r>
-            <a:br>
-              <a:rPr lang="en-US" dirty="0"/>
-            </a:br>
-            <a:r>
-              <a:rPr lang="en-US" dirty="0"/>
-              <a:t>    </a:t>
-            </a:r>
-            <a:r>
-              <a:rPr lang="en-US" b="1" dirty="0"/>
-              <a:t>if </a:t>
-            </a:r>
-            <a:r>
-              <a:rPr lang="en-US" dirty="0"/>
-              <a:t>(</a:t>
-            </a:r>
-            <a:r>
-              <a:rPr lang="en-US" dirty="0" err="1"/>
-              <a:t>data.data.ok</a:t>
-            </a:r>
-            <a:r>
-              <a:rPr lang="en-US" dirty="0"/>
-              <a:t>) {</a:t>
-            </a:r>
-            <a:br>
-              <a:rPr lang="en-US" dirty="0"/>
-            </a:br>
-            <a:r>
-              <a:rPr lang="en-US" dirty="0"/>
-              <a:t>      _</a:t>
-            </a:r>
-            <a:r>
-              <a:rPr lang="en-US" dirty="0" err="1"/>
-              <a:t>t.highPriority</a:t>
-            </a:r>
-            <a:r>
-              <a:rPr lang="en-US" dirty="0"/>
-              <a:t> = </a:t>
-            </a:r>
-            <a:r>
-              <a:rPr lang="en-US" dirty="0" err="1"/>
-              <a:t>cbk</a:t>
-            </a:r>
-            <a:r>
-              <a:rPr lang="en-US" dirty="0"/>
-              <a:t>;</a:t>
-            </a:r>
-            <a:br>
-              <a:rPr lang="en-US" dirty="0"/>
-            </a:br>
-            <a:r>
-              <a:rPr lang="en-US" dirty="0"/>
-              <a:t>    } </a:t>
-            </a:r>
-            <a:r>
-              <a:rPr lang="en-US" b="1" dirty="0"/>
-              <a:t>else </a:t>
-            </a:r>
-            <a:r>
-              <a:rPr lang="en-US" dirty="0"/>
-              <a:t>{</a:t>
-            </a:r>
-            <a:br>
-              <a:rPr lang="en-US" dirty="0"/>
-            </a:br>
-            <a:r>
-              <a:rPr lang="en-US" dirty="0"/>
-              <a:t>      alert('Oops something went wrong!');</a:t>
-            </a:r>
-            <a:br>
-              <a:rPr lang="en-US" dirty="0"/>
-            </a:br>
-            <a:r>
-              <a:rPr lang="en-US" dirty="0"/>
-              <a:t>    }</a:t>
-            </a:r>
-            <a:br>
-              <a:rPr lang="en-US" dirty="0"/>
-            </a:br>
+              <a:t>    });</a:t>
+            </a:r>
+          </a:p>
+          <a:p>
+            <a:pPr marL="0" indent="0">
+              <a:buNone/>
+            </a:pPr>
             <a:r>
               <a:rPr lang="en-US" dirty="0"/>
               <a:t>  });</a:t>
-            </a:r>
-            <a:br>
-              <a:rPr lang="en-US" dirty="0"/>
-            </a:br>
-            <a:r>
-              <a:rPr lang="en-US" dirty="0"/>
-              <a:t>};</a:t>
             </a:r>
           </a:p>
         </p:txBody>
@@ -17917,13 +17919,20 @@
     </p:spTree>
     <p:extLst>
       <p:ext uri="{BB962C8B-B14F-4D97-AF65-F5344CB8AC3E}">
-        <p14:creationId xmlns:p14="http://schemas.microsoft.com/office/powerpoint/2010/main" val="2445364700"/>
+        <p14:creationId xmlns:p14="http://schemas.microsoft.com/office/powerpoint/2010/main" val="691868760"/>
       </p:ext>
     </p:extLst>
   </p:cSld>
   <p:clrMapOvr>
     <a:masterClrMapping/>
   </p:clrMapOvr>
+  <p:timing>
+    <p:tnLst>
+      <p:par>
+        <p:cTn id="1" dur="indefinite" restart="never" nodeType="tmRoot"/>
+      </p:par>
+    </p:tnLst>
+  </p:timing>
 </p:sld>
 </file>
 
@@ -18055,276 +18064,6 @@
             </a:pPr>
             <a:r>
               <a:rPr lang="en-US" dirty="0"/>
-              <a:t>    delete </a:t>
-            </a:r>
-            <a:r>
-              <a:rPr lang="en-US" dirty="0" err="1"/>
-              <a:t>req.body</a:t>
-            </a:r>
-            <a:r>
-              <a:rPr lang="en-US" dirty="0"/>
-              <a:t>["_id"];</a:t>
-            </a:r>
-          </a:p>
-          <a:p>
-            <a:pPr marL="0" indent="0">
-              <a:buNone/>
-            </a:pPr>
-            <a:r>
-              <a:rPr lang="en-US" dirty="0"/>
-              <a:t>   </a:t>
-            </a:r>
-            <a:r>
-              <a:rPr lang="en-US" b="1" dirty="0"/>
-              <a:t> </a:t>
-            </a:r>
-            <a:r>
-              <a:rPr lang="en-US" b="1" dirty="0" err="1"/>
-              <a:t>db.todos.update</a:t>
-            </a:r>
-            <a:r>
-              <a:rPr lang="en-US" b="1" dirty="0"/>
-              <a:t>({</a:t>
-            </a:r>
-          </a:p>
-          <a:p>
-            <a:pPr marL="0" indent="0">
-              <a:buNone/>
-            </a:pPr>
-            <a:r>
-              <a:rPr lang="en-US" b="1" dirty="0"/>
-              <a:t>      _id: </a:t>
-            </a:r>
-            <a:r>
-              <a:rPr lang="en-US" b="1" dirty="0" err="1"/>
-              <a:t>mongojs.ObjectId</a:t>
-            </a:r>
-            <a:r>
-              <a:rPr lang="en-US" b="1" dirty="0"/>
-              <a:t>(id)</a:t>
-            </a:r>
-          </a:p>
-          <a:p>
-            <a:pPr marL="0" indent="0">
-              <a:buNone/>
-            </a:pPr>
-            <a:r>
-              <a:rPr lang="en-US" b="1" dirty="0"/>
-              <a:t>    }, </a:t>
-            </a:r>
-            <a:r>
-              <a:rPr lang="en-US" b="1" dirty="0" err="1"/>
-              <a:t>req.body</a:t>
-            </a:r>
-            <a:r>
-              <a:rPr lang="en-US" b="1" dirty="0"/>
-              <a:t>, </a:t>
-            </a:r>
-            <a:r>
-              <a:rPr lang="en-US" dirty="0"/>
-              <a:t>{}, function(err, data) </a:t>
-            </a:r>
-            <a:r>
-              <a:rPr lang="en-US" dirty="0" smtClean="0"/>
-              <a:t>{</a:t>
-            </a:r>
-            <a:endParaRPr lang="en-US" dirty="0"/>
-          </a:p>
-          <a:p>
-            <a:pPr marL="0" indent="0">
-              <a:buNone/>
-            </a:pPr>
-            <a:r>
-              <a:rPr lang="en-US" dirty="0"/>
-              <a:t>      </a:t>
-            </a:r>
-            <a:r>
-              <a:rPr lang="en-US" dirty="0" err="1"/>
-              <a:t>res.json</a:t>
-            </a:r>
-            <a:r>
-              <a:rPr lang="en-US" dirty="0"/>
-              <a:t>(data);</a:t>
-            </a:r>
-          </a:p>
-          <a:p>
-            <a:pPr marL="0" indent="0">
-              <a:buNone/>
-            </a:pPr>
-            <a:r>
-              <a:rPr lang="en-US" dirty="0"/>
-              <a:t>      </a:t>
-            </a:r>
-            <a:r>
-              <a:rPr lang="en-US" dirty="0" err="1"/>
-              <a:t>req.body</a:t>
-            </a:r>
-            <a:r>
-              <a:rPr lang="en-US" dirty="0"/>
-              <a:t>["_id"] = id;</a:t>
-            </a:r>
-          </a:p>
-          <a:p>
-            <a:pPr marL="0" indent="0">
-              <a:buNone/>
-            </a:pPr>
-            <a:r>
-              <a:rPr lang="en-US" dirty="0"/>
-              <a:t>    });</a:t>
-            </a:r>
-          </a:p>
-          <a:p>
-            <a:pPr marL="0" indent="0">
-              <a:buNone/>
-            </a:pPr>
-            <a:r>
-              <a:rPr lang="en-US" dirty="0"/>
-              <a:t>  });</a:t>
-            </a:r>
-          </a:p>
-        </p:txBody>
-      </p:sp>
-    </p:spTree>
-    <p:extLst>
-      <p:ext uri="{BB962C8B-B14F-4D97-AF65-F5344CB8AC3E}">
-        <p14:creationId xmlns:p14="http://schemas.microsoft.com/office/powerpoint/2010/main" val="691868760"/>
-      </p:ext>
-    </p:extLst>
-  </p:cSld>
-  <p:clrMapOvr>
-    <a:masterClrMapping/>
-  </p:clrMapOvr>
-</p:sld>
-</file>
-
-<file path=ppt/slides/slide39.xml><?xml version="1.0" encoding="utf-8"?>
-<p:sld xmlns:a="http://schemas.openxmlformats.org/drawingml/2006/main" xmlns:r="http://schemas.openxmlformats.org/officeDocument/2006/relationships" xmlns:p="http://schemas.openxmlformats.org/presentationml/2006/main">
-  <p:cSld>
-    <p:spTree>
-      <p:nvGrpSpPr>
-        <p:cNvPr id="1" name=""/>
-        <p:cNvGrpSpPr/>
-        <p:nvPr/>
-      </p:nvGrpSpPr>
-      <p:grpSpPr>
-        <a:xfrm>
-          <a:off x="0" y="0"/>
-          <a:ext cx="0" cy="0"/>
-          <a:chOff x="0" y="0"/>
-          <a:chExt cx="0" cy="0"/>
-        </a:xfrm>
-      </p:grpSpPr>
-      <p:sp>
-        <p:nvSpPr>
-          <p:cNvPr id="2" name="Title 1"/>
-          <p:cNvSpPr>
-            <a:spLocks noGrp="1"/>
-          </p:cNvSpPr>
-          <p:nvPr>
-            <p:ph type="title"/>
-          </p:nvPr>
-        </p:nvSpPr>
-        <p:spPr/>
-        <p:txBody>
-          <a:bodyPr/>
-          <a:lstStyle/>
-          <a:p>
-            <a:r>
-              <a:rPr lang="en-US" dirty="0" smtClean="0"/>
-              <a:t>Express Server</a:t>
-            </a:r>
-            <a:endParaRPr lang="en-US" dirty="0"/>
-          </a:p>
-        </p:txBody>
-      </p:sp>
-      <p:sp>
-        <p:nvSpPr>
-          <p:cNvPr id="3" name="Content Placeholder 2"/>
-          <p:cNvSpPr>
-            <a:spLocks noGrp="1"/>
-          </p:cNvSpPr>
-          <p:nvPr>
-            <p:ph idx="1"/>
-          </p:nvPr>
-        </p:nvSpPr>
-        <p:spPr/>
-        <p:txBody>
-          <a:bodyPr>
-            <a:normAutofit fontScale="85000" lnSpcReduction="20000"/>
-          </a:bodyPr>
-          <a:lstStyle/>
-          <a:p>
-            <a:pPr marL="0" indent="0">
-              <a:buNone/>
-            </a:pPr>
-            <a:r>
-              <a:rPr lang="en-US" dirty="0"/>
-              <a:t> </a:t>
-            </a:r>
-            <a:r>
-              <a:rPr lang="en-US" dirty="0" err="1"/>
-              <a:t>router.put</a:t>
-            </a:r>
-            <a:r>
-              <a:rPr lang="en-US" dirty="0"/>
-              <a:t>('/</a:t>
-            </a:r>
-            <a:r>
-              <a:rPr lang="en-US" dirty="0" err="1"/>
-              <a:t>api</a:t>
-            </a:r>
-            <a:r>
-              <a:rPr lang="en-US" dirty="0"/>
-              <a:t>/</a:t>
-            </a:r>
-            <a:r>
-              <a:rPr lang="en-US" dirty="0" err="1"/>
-              <a:t>todos</a:t>
-            </a:r>
-            <a:r>
-              <a:rPr lang="en-US" dirty="0"/>
-              <a:t>', function(</a:t>
-            </a:r>
-            <a:r>
-              <a:rPr lang="en-US" dirty="0" err="1"/>
-              <a:t>req</a:t>
-            </a:r>
-            <a:r>
-              <a:rPr lang="en-US" dirty="0"/>
-              <a:t>, res) {</a:t>
-            </a:r>
-          </a:p>
-          <a:p>
-            <a:pPr marL="0" indent="0">
-              <a:buNone/>
-            </a:pPr>
-            <a:r>
-              <a:rPr lang="en-US" dirty="0"/>
-              <a:t>    </a:t>
-            </a:r>
-            <a:r>
-              <a:rPr lang="en-US" dirty="0" err="1"/>
-              <a:t>var</a:t>
-            </a:r>
-            <a:r>
-              <a:rPr lang="en-US" dirty="0"/>
-              <a:t> id = </a:t>
-            </a:r>
-            <a:r>
-              <a:rPr lang="en-US" dirty="0" err="1"/>
-              <a:t>req.body._id</a:t>
-            </a:r>
-            <a:r>
-              <a:rPr lang="en-US" dirty="0"/>
-              <a:t>;</a:t>
-            </a:r>
-          </a:p>
-          <a:p>
-            <a:pPr marL="0" indent="0">
-              <a:buNone/>
-            </a:pPr>
-            <a:r>
-              <a:rPr lang="en-US" dirty="0"/>
               <a:t>    </a:t>
             </a:r>
             <a:r>
@@ -18460,6 +18199,13 @@
   <p:clrMapOvr>
     <a:masterClrMapping/>
   </p:clrMapOvr>
+  <p:timing>
+    <p:tnLst>
+      <p:par>
+        <p:cTn id="1" dur="indefinite" restart="never" nodeType="tmRoot"/>
+      </p:par>
+    </p:tnLst>
+  </p:timing>
 </p:sld>
 </file>
 
@@ -18656,25 +18402,13 @@
             </a:pPr>
             <a:r>
               <a:rPr lang="en-US" sz="2000" dirty="0"/>
-              <a:t>        },</a:t>
-            </a:r>
-          </a:p>
-          <a:p>
-            <a:pPr marL="0" indent="0">
-              <a:buNone/>
-            </a:pPr>
+              <a:t>        </a:t>
+            </a:r>
             <a:r>
               <a:rPr lang="en-US" sz="2000" dirty="0" smtClean="0"/>
-              <a:t>        "</a:t>
-            </a:r>
-            <a:r>
-              <a:rPr lang="en-US" sz="2000" dirty="0" err="1"/>
-              <a:t>imdbRating</a:t>
-            </a:r>
-            <a:r>
-              <a:rPr lang="en-US" sz="2000" dirty="0"/>
-              <a:t>" : "8.0"</a:t>
-            </a:r>
+              <a:t>}</a:t>
+            </a:r>
+            <a:endParaRPr lang="en-US" sz="2000" dirty="0"/>
           </a:p>
           <a:p>
             <a:pPr marL="0" indent="0">
@@ -18904,25 +18638,13 @@
             </a:pPr>
             <a:r>
               <a:rPr lang="en-US" sz="2000" dirty="0"/>
-              <a:t>        },</a:t>
-            </a:r>
-          </a:p>
-          <a:p>
-            <a:pPr marL="0" indent="0">
-              <a:buNone/>
-            </a:pPr>
+              <a:t>        </a:t>
+            </a:r>
             <a:r>
               <a:rPr lang="en-US" sz="2000" dirty="0" smtClean="0"/>
-              <a:t>        "</a:t>
-            </a:r>
-            <a:r>
-              <a:rPr lang="en-US" sz="2000" dirty="0" err="1"/>
-              <a:t>imdbRating</a:t>
-            </a:r>
-            <a:r>
-              <a:rPr lang="en-US" sz="2000" dirty="0"/>
-              <a:t>" : "8.0"</a:t>
-            </a:r>
+              <a:t>}</a:t>
+            </a:r>
+            <a:endParaRPr lang="en-US" sz="2000" dirty="0"/>
           </a:p>
           <a:p>
             <a:pPr marL="0" indent="0">
@@ -19148,28 +18870,11 @@
             </a:pPr>
             <a:r>
               <a:rPr lang="en-US" sz="2000" b="1" dirty="0"/>
-              <a:t>        },</a:t>
-            </a:r>
-          </a:p>
-          <a:p>
-            <a:pPr marL="0" indent="0">
-              <a:buNone/>
-            </a:pPr>
-            <a:r>
-              <a:rPr lang="en-US" sz="2000" dirty="0" smtClean="0"/>
-              <a:t>        "</a:t>
-            </a:r>
-            <a:r>
-              <a:rPr lang="en-US" sz="2000" dirty="0" err="1"/>
-              <a:t>imdbRating</a:t>
-            </a:r>
-            <a:r>
-              <a:rPr lang="en-US" sz="2000" dirty="0"/>
-              <a:t>" : </a:t>
-            </a:r>
-            <a:r>
-              <a:rPr lang="en-US" sz="2000" dirty="0" smtClean="0"/>
-              <a:t>8.0</a:t>
+              <a:t>        </a:t>
+            </a:r>
+            <a:r>
+              <a:rPr lang="en-US" sz="2000" b="1" dirty="0" smtClean="0"/>
+              <a:t>}</a:t>
             </a:r>
             <a:endParaRPr lang="en-US" sz="2000" dirty="0"/>
           </a:p>
@@ -19397,24 +19102,11 @@
             </a:pPr>
             <a:r>
               <a:rPr lang="en-US" sz="2000" dirty="0"/>
-              <a:t>        },</a:t>
-            </a:r>
-          </a:p>
-          <a:p>
-            <a:pPr marL="0" indent="0">
-              <a:buNone/>
-            </a:pPr>
+              <a:t>        </a:t>
+            </a:r>
             <a:r>
               <a:rPr lang="en-US" sz="2000" dirty="0" smtClean="0"/>
-              <a:t>        "</a:t>
-            </a:r>
-            <a:r>
-              <a:rPr lang="en-US" sz="2000" dirty="0" err="1"/>
-              <a:t>imdbRating</a:t>
-            </a:r>
-            <a:r>
-              <a:rPr lang="en-US" sz="2000" dirty="0"/>
-              <a:t>" : "8.0"</a:t>
+              <a:t>}</a:t>
             </a:r>
           </a:p>
           <a:p>
@@ -19518,11 +19210,7 @@
           <a:p>
             <a:r>
               <a:rPr lang="en-US" dirty="0" smtClean="0"/>
-              <a:t>Horizontal </a:t>
-            </a:r>
-            <a:r>
-              <a:rPr lang="en-US" dirty="0" smtClean="0"/>
-              <a:t>Scaling</a:t>
+              <a:t>Horizontal Scaling</a:t>
             </a:r>
           </a:p>
         </p:txBody>
@@ -19689,6 +19377,13 @@
   <p:clrMapOvr>
     <a:masterClrMapping/>
   </p:clrMapOvr>
+  <p:timing>
+    <p:tnLst>
+      <p:par>
+        <p:cTn id="1" dur="indefinite" restart="never" nodeType="tmRoot"/>
+      </p:par>
+    </p:tnLst>
+  </p:timing>
 </p:sld>
 </file>
 

</xml_diff>